<commit_message>
report templates added (qmd not working for pptx, thus switched back to .rmd)
TODO: new template
</commit_message>
<xml_diff>
--- a/output/presentations/presentation.pptx
+++ b/output/presentations/presentation.pptx
@@ -1,6 +1,6 @@
 
 <file path=ppt/presentation.xml><?xml version="1.0" encoding="utf-8"?>
-<p:presentation xmlns:a="http://schemas.openxmlformats.org/drawingml/2006/main" xmlns:r="http://schemas.openxmlformats.org/officeDocument/2006/relationships" xmlns:p="http://schemas.openxmlformats.org/presentationml/2006/main" saveSubsetFonts="1" autoCompressPictures="0">
+<p:presentation xmlns:a="http://schemas.openxmlformats.org/drawingml/2006/main" xmlns:p="http://schemas.openxmlformats.org/presentationml/2006/main" xmlns:r="http://schemas.openxmlformats.org/officeDocument/2006/relationships" autoCompressPictures="0" saveSubsetFonts="1">
   <p:sldMasterIdLst>
     <p:sldMasterId id="2147483648" r:id="rId1"/>
   </p:sldMasterIdLst>
@@ -8,6 +8,8 @@
     <p:sldId id="256" r:id="rId2"/>
     <p:sldId id="257" r:id="rId3"/>
     <p:sldId id="258" r:id="rId4"/>
+    <p:sldId id="259" r:id="rId5"/>
+    <p:sldId id="260" r:id="rId6"/>
   </p:sldIdLst>
   <p:sldSz cx="9144000" cy="5715000" type="screen16x10"/>
   <p:notesSz cx="6858000" cy="9144000"/>
@@ -15,8 +17,8 @@
     <a:defPPr>
       <a:defRPr lang="en-US"/>
     </a:defPPr>
-    <a:lvl1pPr marL="0" algn="l" defTabSz="457200" rtl="0" eaLnBrk="1" latinLnBrk="0" hangingPunct="1">
-      <a:defRPr sz="1800" kern="1200">
+    <a:lvl1pPr algn="l" defTabSz="457200" eaLnBrk="1" hangingPunct="1" latinLnBrk="0" marL="0" rtl="0">
+      <a:defRPr kern="1200" sz="1800">
         <a:solidFill>
           <a:schemeClr val="tx1"/>
         </a:solidFill>
@@ -25,8 +27,8 @@
         <a:cs typeface="+mn-cs"/>
       </a:defRPr>
     </a:lvl1pPr>
-    <a:lvl2pPr marL="457200" algn="l" defTabSz="457200" rtl="0" eaLnBrk="1" latinLnBrk="0" hangingPunct="1">
-      <a:defRPr sz="1800" kern="1200">
+    <a:lvl2pPr algn="l" defTabSz="457200" eaLnBrk="1" hangingPunct="1" latinLnBrk="0" marL="457200" rtl="0">
+      <a:defRPr kern="1200" sz="1800">
         <a:solidFill>
           <a:schemeClr val="tx1"/>
         </a:solidFill>
@@ -35,8 +37,8 @@
         <a:cs typeface="+mn-cs"/>
       </a:defRPr>
     </a:lvl2pPr>
-    <a:lvl3pPr marL="914400" algn="l" defTabSz="457200" rtl="0" eaLnBrk="1" latinLnBrk="0" hangingPunct="1">
-      <a:defRPr sz="1800" kern="1200">
+    <a:lvl3pPr algn="l" defTabSz="457200" eaLnBrk="1" hangingPunct="1" latinLnBrk="0" marL="914400" rtl="0">
+      <a:defRPr kern="1200" sz="1800">
         <a:solidFill>
           <a:schemeClr val="tx1"/>
         </a:solidFill>
@@ -45,8 +47,8 @@
         <a:cs typeface="+mn-cs"/>
       </a:defRPr>
     </a:lvl3pPr>
-    <a:lvl4pPr marL="1371600" algn="l" defTabSz="457200" rtl="0" eaLnBrk="1" latinLnBrk="0" hangingPunct="1">
-      <a:defRPr sz="1800" kern="1200">
+    <a:lvl4pPr algn="l" defTabSz="457200" eaLnBrk="1" hangingPunct="1" latinLnBrk="0" marL="1371600" rtl="0">
+      <a:defRPr kern="1200" sz="1800">
         <a:solidFill>
           <a:schemeClr val="tx1"/>
         </a:solidFill>
@@ -55,8 +57,8 @@
         <a:cs typeface="+mn-cs"/>
       </a:defRPr>
     </a:lvl4pPr>
-    <a:lvl5pPr marL="1828800" algn="l" defTabSz="457200" rtl="0" eaLnBrk="1" latinLnBrk="0" hangingPunct="1">
-      <a:defRPr sz="1800" kern="1200">
+    <a:lvl5pPr algn="l" defTabSz="457200" eaLnBrk="1" hangingPunct="1" latinLnBrk="0" marL="1828800" rtl="0">
+      <a:defRPr kern="1200" sz="1800">
         <a:solidFill>
           <a:schemeClr val="tx1"/>
         </a:solidFill>
@@ -65,8 +67,8 @@
         <a:cs typeface="+mn-cs"/>
       </a:defRPr>
     </a:lvl5pPr>
-    <a:lvl6pPr marL="2286000" algn="l" defTabSz="457200" rtl="0" eaLnBrk="1" latinLnBrk="0" hangingPunct="1">
-      <a:defRPr sz="1800" kern="1200">
+    <a:lvl6pPr algn="l" defTabSz="457200" eaLnBrk="1" hangingPunct="1" latinLnBrk="0" marL="2286000" rtl="0">
+      <a:defRPr kern="1200" sz="1800">
         <a:solidFill>
           <a:schemeClr val="tx1"/>
         </a:solidFill>
@@ -75,8 +77,8 @@
         <a:cs typeface="+mn-cs"/>
       </a:defRPr>
     </a:lvl6pPr>
-    <a:lvl7pPr marL="2743200" algn="l" defTabSz="457200" rtl="0" eaLnBrk="1" latinLnBrk="0" hangingPunct="1">
-      <a:defRPr sz="1800" kern="1200">
+    <a:lvl7pPr algn="l" defTabSz="457200" eaLnBrk="1" hangingPunct="1" latinLnBrk="0" marL="2743200" rtl="0">
+      <a:defRPr kern="1200" sz="1800">
         <a:solidFill>
           <a:schemeClr val="tx1"/>
         </a:solidFill>
@@ -85,8 +87,8 @@
         <a:cs typeface="+mn-cs"/>
       </a:defRPr>
     </a:lvl7pPr>
-    <a:lvl8pPr marL="3200400" algn="l" defTabSz="457200" rtl="0" eaLnBrk="1" latinLnBrk="0" hangingPunct="1">
-      <a:defRPr sz="1800" kern="1200">
+    <a:lvl8pPr algn="l" defTabSz="457200" eaLnBrk="1" hangingPunct="1" latinLnBrk="0" marL="3200400" rtl="0">
+      <a:defRPr kern="1200" sz="1800">
         <a:solidFill>
           <a:schemeClr val="tx1"/>
         </a:solidFill>
@@ -95,8 +97,8 @@
         <a:cs typeface="+mn-cs"/>
       </a:defRPr>
     </a:lvl8pPr>
-    <a:lvl9pPr marL="3657600" algn="l" defTabSz="457200" rtl="0" eaLnBrk="1" latinLnBrk="0" hangingPunct="1">
-      <a:defRPr sz="1800" kern="1200">
+    <a:lvl9pPr algn="l" defTabSz="457200" eaLnBrk="1" hangingPunct="1" latinLnBrk="0" marL="3657600" rtl="0">
+      <a:defRPr kern="1200" sz="1800">
         <a:solidFill>
           <a:schemeClr val="tx1"/>
         </a:solidFill>
@@ -130,7 +132,7 @@
 
 <file path=ppt/slideLayouts/slideLayout1.xml><?xml version="1.0" encoding="utf-8"?>
 <p:sldLayout xmlns:a="http://schemas.openxmlformats.org/drawingml/2006/main" xmlns:r="http://schemas.openxmlformats.org/officeDocument/2006/relationships" xmlns:p="http://schemas.openxmlformats.org/presentationml/2006/main" type="title" preserve="1">
-  <p:cSld name="1_Title Slide">
+  <p:cSld name="Title Slide">
     <p:spTree>
       <p:nvGrpSpPr>
         <p:cNvPr id="1" name=""/>
@@ -157,23 +159,18 @@
         </p:nvSpPr>
         <p:spPr>
           <a:xfrm>
-            <a:off x="726621" y="935302"/>
-            <a:ext cx="7274379" cy="1989667"/>
+            <a:off x="685800" y="1597819"/>
+            <a:ext cx="7772400" cy="1102519"/>
           </a:xfrm>
         </p:spPr>
         <p:txBody>
-          <a:bodyPr anchor="b"/>
-          <a:lstStyle>
-            <a:lvl1pPr algn="l">
-              <a:defRPr sz="4000"/>
-            </a:lvl1pPr>
-          </a:lstStyle>
+          <a:bodyPr/>
+          <a:lstStyle/>
           <a:p>
             <a:r>
               <a:rPr lang="en-US"/>
               <a:t>Click to edit Master title style</a:t>
             </a:r>
-            <a:endParaRPr lang="en-US" dirty="0"/>
           </a:p>
         </p:txBody>
       </p:sp>
@@ -189,48 +186,102 @@
         </p:nvSpPr>
         <p:spPr>
           <a:xfrm>
-            <a:off x="726621" y="3001698"/>
-            <a:ext cx="7274379" cy="1379802"/>
+            <a:off x="1371600" y="2914650"/>
+            <a:ext cx="6400800" cy="1314450"/>
           </a:xfrm>
         </p:spPr>
         <p:txBody>
           <a:bodyPr/>
           <a:lstStyle>
-            <a:lvl1pPr marL="0" indent="0" algn="l">
-              <a:buNone/>
-              <a:defRPr sz="1800"/>
+            <a:lvl1pPr marL="0" indent="0" algn="ctr">
+              <a:buNone/>
+              <a:defRPr>
+                <a:solidFill>
+                  <a:schemeClr val="tx1">
+                    <a:tint val="75000"/>
+                  </a:schemeClr>
+                </a:solidFill>
+              </a:defRPr>
             </a:lvl1pPr>
             <a:lvl2pPr marL="342900" indent="0" algn="ctr">
               <a:buNone/>
-              <a:defRPr sz="1500"/>
+              <a:defRPr>
+                <a:solidFill>
+                  <a:schemeClr val="tx1">
+                    <a:tint val="75000"/>
+                  </a:schemeClr>
+                </a:solidFill>
+              </a:defRPr>
             </a:lvl2pPr>
             <a:lvl3pPr marL="685800" indent="0" algn="ctr">
               <a:buNone/>
-              <a:defRPr sz="1350"/>
+              <a:defRPr>
+                <a:solidFill>
+                  <a:schemeClr val="tx1">
+                    <a:tint val="75000"/>
+                  </a:schemeClr>
+                </a:solidFill>
+              </a:defRPr>
             </a:lvl3pPr>
             <a:lvl4pPr marL="1028700" indent="0" algn="ctr">
               <a:buNone/>
-              <a:defRPr sz="1200"/>
+              <a:defRPr>
+                <a:solidFill>
+                  <a:schemeClr val="tx1">
+                    <a:tint val="75000"/>
+                  </a:schemeClr>
+                </a:solidFill>
+              </a:defRPr>
             </a:lvl4pPr>
             <a:lvl5pPr marL="1371600" indent="0" algn="ctr">
               <a:buNone/>
-              <a:defRPr sz="1200"/>
+              <a:defRPr>
+                <a:solidFill>
+                  <a:schemeClr val="tx1">
+                    <a:tint val="75000"/>
+                  </a:schemeClr>
+                </a:solidFill>
+              </a:defRPr>
             </a:lvl5pPr>
             <a:lvl6pPr marL="1714500" indent="0" algn="ctr">
               <a:buNone/>
-              <a:defRPr sz="1200"/>
+              <a:defRPr>
+                <a:solidFill>
+                  <a:schemeClr val="tx1">
+                    <a:tint val="75000"/>
+                  </a:schemeClr>
+                </a:solidFill>
+              </a:defRPr>
             </a:lvl6pPr>
             <a:lvl7pPr marL="2057400" indent="0" algn="ctr">
               <a:buNone/>
-              <a:defRPr sz="1200"/>
+              <a:defRPr>
+                <a:solidFill>
+                  <a:schemeClr val="tx1">
+                    <a:tint val="75000"/>
+                  </a:schemeClr>
+                </a:solidFill>
+              </a:defRPr>
             </a:lvl7pPr>
             <a:lvl8pPr marL="2400300" indent="0" algn="ctr">
               <a:buNone/>
-              <a:defRPr sz="1200"/>
+              <a:defRPr>
+                <a:solidFill>
+                  <a:schemeClr val="tx1">
+                    <a:tint val="75000"/>
+                  </a:schemeClr>
+                </a:solidFill>
+              </a:defRPr>
             </a:lvl8pPr>
             <a:lvl9pPr marL="2743200" indent="0" algn="ctr">
               <a:buNone/>
-              <a:defRPr sz="1200"/>
+              <a:defRPr>
+                <a:solidFill>
+                  <a:schemeClr val="tx1">
+                    <a:tint val="75000"/>
+                  </a:schemeClr>
+                </a:solidFill>
+              </a:defRPr>
             </a:lvl9pPr>
           </a:lstStyle>
           <a:p>
@@ -238,19 +289,12 @@
               <a:rPr lang="en-US"/>
               <a:t>Click to edit Master subtitle style</a:t>
             </a:r>
-            <a:endParaRPr lang="en-US" dirty="0"/>
-          </a:p>
-        </p:txBody>
-      </p:sp>
-      <p:sp>
-        <p:nvSpPr>
-          <p:cNvPr id="4" name="Datumsplatzhalter 3">
-            <a:extLst>
-              <a:ext uri="{FF2B5EF4-FFF2-40B4-BE49-F238E27FC236}">
-                <a16:creationId xmlns:a16="http://schemas.microsoft.com/office/drawing/2014/main" id="{EFA66E54-C5DF-2A42-823E-BB2E1565128A}"/>
-              </a:ext>
-            </a:extLst>
-          </p:cNvPr>
+          </a:p>
+        </p:txBody>
+      </p:sp>
+      <p:sp>
+        <p:nvSpPr>
+          <p:cNvPr id="4" name="Date Placeholder 3"/>
           <p:cNvSpPr>
             <a:spLocks noGrp="1"/>
           </p:cNvSpPr>
@@ -263,23 +307,36 @@
           <a:bodyPr/>
           <a:lstStyle/>
           <a:p>
-            <a:fld id="{43455C3B-440F-3444-BF75-9806704B7A54}" type="datetime1">
-              <a:rPr lang="de-DE" smtClean="0"/>
-              <a:t>02.06.21</a:t>
+            <a:fld id="{241EB5C9-1307-BA42-ABA2-0BC069CD8E7F}" type="datetimeFigureOut">
+              <a:rPr lang="en-US" smtClean="0"/>
+              <a:t>1/2/22</a:t>
             </a:fld>
-            <a:endParaRPr lang="en-US" dirty="0"/>
-          </a:p>
-        </p:txBody>
-      </p:sp>
-      <p:sp>
-        <p:nvSpPr>
-          <p:cNvPr id="7" name="Foliennummernplatzhalter 6">
-            <a:extLst>
-              <a:ext uri="{FF2B5EF4-FFF2-40B4-BE49-F238E27FC236}">
-                <a16:creationId xmlns:a16="http://schemas.microsoft.com/office/drawing/2014/main" id="{6E5995EC-E956-1242-830B-680F8C6F66A4}"/>
-              </a:ext>
-            </a:extLst>
-          </p:cNvPr>
+            <a:endParaRPr lang="en-US"/>
+          </a:p>
+        </p:txBody>
+      </p:sp>
+      <p:sp>
+        <p:nvSpPr>
+          <p:cNvPr id="5" name="Footer Placeholder 4"/>
+          <p:cNvSpPr>
+            <a:spLocks noGrp="1"/>
+          </p:cNvSpPr>
+          <p:nvPr>
+            <p:ph type="ftr" sz="quarter" idx="11"/>
+          </p:nvPr>
+        </p:nvSpPr>
+        <p:spPr/>
+        <p:txBody>
+          <a:bodyPr/>
+          <a:lstStyle/>
+          <a:p>
+            <a:endParaRPr lang="en-US"/>
+          </a:p>
+        </p:txBody>
+      </p:sp>
+      <p:sp>
+        <p:nvSpPr>
+          <p:cNvPr id="6" name="Slide Number Placeholder 5"/>
           <p:cNvSpPr>
             <a:spLocks noGrp="1"/>
           </p:cNvSpPr>
@@ -290,54 +347,20 @@
         <p:spPr/>
         <p:txBody>
           <a:bodyPr/>
-          <a:lstStyle>
-            <a:lvl1pPr algn="ctr">
-              <a:defRPr/>
-            </a:lvl1pPr>
-          </a:lstStyle>
-          <a:p>
-            <a:fld id="{F9EA80F1-969D-7843-BBE2-853A1F17A34A}" type="slidenum">
-              <a:rPr lang="en-GB" smtClean="0"/>
-              <a:pPr/>
-              <a:t>‹Nr.›</a:t>
+          <a:lstStyle/>
+          <a:p>
+            <a:fld id="{C5EF2332-01BF-834F-8236-50238282D533}" type="slidenum">
+              <a:rPr lang="en-US" smtClean="0"/>
+              <a:t>‹#›</a:t>
             </a:fld>
-            <a:endParaRPr lang="en-GB" dirty="0"/>
-          </a:p>
-        </p:txBody>
-      </p:sp>
-      <p:pic>
-        <p:nvPicPr>
-          <p:cNvPr id="9" name="Grafik 8">
-            <a:extLst>
-              <a:ext uri="{FF2B5EF4-FFF2-40B4-BE49-F238E27FC236}">
-                <a16:creationId xmlns:a16="http://schemas.microsoft.com/office/drawing/2014/main" id="{8B63EA74-7915-BA48-86D8-AE35814BEB54}"/>
-              </a:ext>
-            </a:extLst>
-          </p:cNvPr>
-          <p:cNvPicPr>
-            <a:picLocks noChangeAspect="1"/>
-          </p:cNvPicPr>
-          <p:nvPr userDrawn="1"/>
-        </p:nvPicPr>
-        <p:blipFill rotWithShape="1">
-          <a:blip r:embed="rId2"/>
-          <a:srcRect r="40898" b="4729"/>
-          <a:stretch/>
-        </p:blipFill>
-        <p:spPr>
-          <a:xfrm>
-            <a:off x="215502" y="47760"/>
-            <a:ext cx="2859741" cy="447678"/>
-          </a:xfrm>
-          <a:prstGeom prst="rect">
-            <a:avLst/>
-          </a:prstGeom>
-        </p:spPr>
-      </p:pic>
+            <a:endParaRPr lang="en-US"/>
+          </a:p>
+        </p:txBody>
+      </p:sp>
     </p:spTree>
     <p:extLst>
       <p:ext uri="{BB962C8B-B14F-4D97-AF65-F5344CB8AC3E}">
-        <p14:creationId xmlns:p14="http://schemas.microsoft.com/office/powerpoint/2010/main" val="3304490913"/>
+        <p14:creationId xmlns:p14="http://schemas.microsoft.com/office/powerpoint/2010/main" val="1444357513"/>
       </p:ext>
     </p:extLst>
   </p:cSld>
@@ -380,10 +403,9 @@
           <a:lstStyle/>
           <a:p>
             <a:r>
-              <a:rPr lang="en-US" smtClean="0"/>
+              <a:rPr lang="en-US"/>
               <a:t>Click to edit Master title style</a:t>
             </a:r>
-            <a:endParaRPr lang="en-US"/>
           </a:p>
         </p:txBody>
       </p:sp>
@@ -404,38 +426,37 @@
           <a:p>
             <a:pPr lvl="0"/>
             <a:r>
-              <a:rPr lang="en-US" smtClean="0"/>
+              <a:rPr lang="en-US"/>
               <a:t>Click to edit Master text styles</a:t>
             </a:r>
           </a:p>
           <a:p>
             <a:pPr lvl="1"/>
             <a:r>
-              <a:rPr lang="en-US" smtClean="0"/>
+              <a:rPr lang="en-US"/>
               <a:t>Second level</a:t>
             </a:r>
           </a:p>
           <a:p>
             <a:pPr lvl="2"/>
             <a:r>
-              <a:rPr lang="en-US" smtClean="0"/>
+              <a:rPr lang="en-US"/>
               <a:t>Third level</a:t>
             </a:r>
           </a:p>
           <a:p>
             <a:pPr lvl="3"/>
             <a:r>
-              <a:rPr lang="en-US" smtClean="0"/>
+              <a:rPr lang="en-US"/>
               <a:t>Fourth level</a:t>
             </a:r>
           </a:p>
           <a:p>
             <a:pPr lvl="4"/>
             <a:r>
-              <a:rPr lang="en-US" smtClean="0"/>
+              <a:rPr lang="en-US"/>
               <a:t>Fifth level</a:t>
             </a:r>
-            <a:endParaRPr lang="en-US"/>
           </a:p>
         </p:txBody>
       </p:sp>
@@ -456,7 +477,7 @@
           <a:p>
             <a:fld id="{241EB5C9-1307-BA42-ABA2-0BC069CD8E7F}" type="datetimeFigureOut">
               <a:rPr lang="en-US" smtClean="0"/>
-              <a:t>4/5/2019</a:t>
+              <a:t>1/2/22</a:t>
             </a:fld>
             <a:endParaRPr lang="en-US"/>
           </a:p>
@@ -546,8 +567,8 @@
         </p:nvSpPr>
         <p:spPr>
           <a:xfrm>
-            <a:off x="6629400" y="274638"/>
-            <a:ext cx="2057400" cy="5851525"/>
+            <a:off x="6629400" y="205979"/>
+            <a:ext cx="2057400" cy="4388644"/>
           </a:xfrm>
         </p:spPr>
         <p:txBody>
@@ -555,10 +576,9 @@
           <a:lstStyle/>
           <a:p>
             <a:r>
-              <a:rPr lang="en-US" smtClean="0"/>
+              <a:rPr lang="en-US"/>
               <a:t>Click to edit Master title style</a:t>
             </a:r>
-            <a:endParaRPr lang="en-US"/>
           </a:p>
         </p:txBody>
       </p:sp>
@@ -574,8 +594,8 @@
         </p:nvSpPr>
         <p:spPr>
           <a:xfrm>
-            <a:off x="457200" y="274638"/>
-            <a:ext cx="6019800" cy="5851525"/>
+            <a:off x="457200" y="205979"/>
+            <a:ext cx="6019800" cy="4388644"/>
           </a:xfrm>
         </p:spPr>
         <p:txBody>
@@ -584,38 +604,37 @@
           <a:p>
             <a:pPr lvl="0"/>
             <a:r>
-              <a:rPr lang="en-US" smtClean="0"/>
+              <a:rPr lang="en-US"/>
               <a:t>Click to edit Master text styles</a:t>
             </a:r>
           </a:p>
           <a:p>
             <a:pPr lvl="1"/>
             <a:r>
-              <a:rPr lang="en-US" smtClean="0"/>
+              <a:rPr lang="en-US"/>
               <a:t>Second level</a:t>
             </a:r>
           </a:p>
           <a:p>
             <a:pPr lvl="2"/>
             <a:r>
-              <a:rPr lang="en-US" smtClean="0"/>
+              <a:rPr lang="en-US"/>
               <a:t>Third level</a:t>
             </a:r>
           </a:p>
           <a:p>
             <a:pPr lvl="3"/>
             <a:r>
-              <a:rPr lang="en-US" smtClean="0"/>
+              <a:rPr lang="en-US"/>
               <a:t>Fourth level</a:t>
             </a:r>
           </a:p>
           <a:p>
             <a:pPr lvl="4"/>
             <a:r>
-              <a:rPr lang="en-US" smtClean="0"/>
+              <a:rPr lang="en-US"/>
               <a:t>Fifth level</a:t>
             </a:r>
-            <a:endParaRPr lang="en-US"/>
           </a:p>
         </p:txBody>
       </p:sp>
@@ -636,7 +655,7 @@
           <a:p>
             <a:fld id="{241EB5C9-1307-BA42-ABA2-0BC069CD8E7F}" type="datetimeFigureOut">
               <a:rPr lang="en-US" smtClean="0"/>
-              <a:t>4/5/2019</a:t>
+              <a:t>1/2/22</a:t>
             </a:fld>
             <a:endParaRPr lang="en-US"/>
           </a:p>
@@ -2461,7 +2480,7 @@
           <a:p>
             <a:fld id="{241EB5C9-1307-BA42-ABA2-0BC069CD8E7F}" type="datetimeFigureOut">
               <a:rPr lang="en-US" smtClean="0"/>
-              <a:t>4/5/2019</a:t>
+              <a:t>1/2/22</a:t>
             </a:fld>
             <a:endParaRPr lang="en-US"/>
           </a:p>
@@ -2551,23 +2570,22 @@
         </p:nvSpPr>
         <p:spPr>
           <a:xfrm>
-            <a:off x="457200" y="273050"/>
-            <a:ext cx="3008313" cy="1162050"/>
+            <a:off x="457201" y="204787"/>
+            <a:ext cx="3008313" cy="871538"/>
           </a:xfrm>
         </p:spPr>
         <p:txBody>
           <a:bodyPr anchor="b"/>
           <a:lstStyle>
             <a:lvl1pPr algn="l">
-              <a:defRPr sz="2000" b="1"/>
+              <a:defRPr sz="1500" b="1"/>
             </a:lvl1pPr>
           </a:lstStyle>
           <a:p>
             <a:r>
-              <a:rPr lang="en-US" smtClean="0"/>
+              <a:rPr lang="en-US"/>
               <a:t>Click to edit Master title style</a:t>
             </a:r>
-            <a:endParaRPr lang="en-US"/>
           </a:p>
         </p:txBody>
       </p:sp>
@@ -2583,76 +2601,75 @@
         </p:nvSpPr>
         <p:spPr>
           <a:xfrm>
-            <a:off x="3575050" y="273050"/>
-            <a:ext cx="5111750" cy="5853113"/>
+            <a:off x="3575050" y="204788"/>
+            <a:ext cx="5111750" cy="4389835"/>
           </a:xfrm>
         </p:spPr>
         <p:txBody>
           <a:bodyPr/>
           <a:lstStyle>
             <a:lvl1pPr>
-              <a:defRPr sz="3200"/>
+              <a:defRPr sz="2400"/>
             </a:lvl1pPr>
             <a:lvl2pPr>
-              <a:defRPr sz="2800"/>
+              <a:defRPr sz="2100"/>
             </a:lvl2pPr>
             <a:lvl3pPr>
-              <a:defRPr sz="2400"/>
+              <a:defRPr sz="1800"/>
             </a:lvl3pPr>
             <a:lvl4pPr>
-              <a:defRPr sz="2000"/>
+              <a:defRPr sz="1500"/>
             </a:lvl4pPr>
             <a:lvl5pPr>
-              <a:defRPr sz="2000"/>
+              <a:defRPr sz="1500"/>
             </a:lvl5pPr>
             <a:lvl6pPr>
-              <a:defRPr sz="2000"/>
+              <a:defRPr sz="1500"/>
             </a:lvl6pPr>
             <a:lvl7pPr>
-              <a:defRPr sz="2000"/>
+              <a:defRPr sz="1500"/>
             </a:lvl7pPr>
             <a:lvl8pPr>
-              <a:defRPr sz="2000"/>
+              <a:defRPr sz="1500"/>
             </a:lvl8pPr>
             <a:lvl9pPr>
-              <a:defRPr sz="2000"/>
+              <a:defRPr sz="1500"/>
             </a:lvl9pPr>
           </a:lstStyle>
           <a:p>
             <a:pPr lvl="0"/>
             <a:r>
-              <a:rPr lang="en-US" smtClean="0"/>
+              <a:rPr lang="en-US"/>
               <a:t>Click to edit Master text styles</a:t>
             </a:r>
           </a:p>
           <a:p>
             <a:pPr lvl="1"/>
             <a:r>
-              <a:rPr lang="en-US" smtClean="0"/>
+              <a:rPr lang="en-US"/>
               <a:t>Second level</a:t>
             </a:r>
           </a:p>
           <a:p>
             <a:pPr lvl="2"/>
             <a:r>
-              <a:rPr lang="en-US" smtClean="0"/>
+              <a:rPr lang="en-US"/>
               <a:t>Third level</a:t>
             </a:r>
           </a:p>
           <a:p>
             <a:pPr lvl="3"/>
             <a:r>
-              <a:rPr lang="en-US" smtClean="0"/>
+              <a:rPr lang="en-US"/>
               <a:t>Fourth level</a:t>
             </a:r>
           </a:p>
           <a:p>
             <a:pPr lvl="4"/>
             <a:r>
-              <a:rPr lang="en-US" smtClean="0"/>
+              <a:rPr lang="en-US"/>
               <a:t>Fifth level</a:t>
             </a:r>
-            <a:endParaRPr lang="en-US"/>
           </a:p>
         </p:txBody>
       </p:sp>
@@ -2668,8 +2685,8 @@
         </p:nvSpPr>
         <p:spPr>
           <a:xfrm>
-            <a:off x="457200" y="1435100"/>
-            <a:ext cx="3008313" cy="4691063"/>
+            <a:off x="457201" y="1076326"/>
+            <a:ext cx="3008313" cy="3518297"/>
           </a:xfrm>
         </p:spPr>
         <p:txBody>
@@ -2677,45 +2694,45 @@
           <a:lstStyle>
             <a:lvl1pPr marL="0" indent="0">
               <a:buNone/>
-              <a:defRPr sz="1400"/>
+              <a:defRPr sz="1050"/>
             </a:lvl1pPr>
-            <a:lvl2pPr marL="457200" indent="0">
-              <a:buNone/>
-              <a:defRPr sz="1200"/>
+            <a:lvl2pPr marL="342900" indent="0">
+              <a:buNone/>
+              <a:defRPr sz="900"/>
             </a:lvl2pPr>
-            <a:lvl3pPr marL="914400" indent="0">
-              <a:buNone/>
-              <a:defRPr sz="1000"/>
+            <a:lvl3pPr marL="685800" indent="0">
+              <a:buNone/>
+              <a:defRPr sz="750"/>
             </a:lvl3pPr>
-            <a:lvl4pPr marL="1371600" indent="0">
-              <a:buNone/>
-              <a:defRPr sz="900"/>
+            <a:lvl4pPr marL="1028700" indent="0">
+              <a:buNone/>
+              <a:defRPr sz="675"/>
             </a:lvl4pPr>
-            <a:lvl5pPr marL="1828800" indent="0">
-              <a:buNone/>
-              <a:defRPr sz="900"/>
+            <a:lvl5pPr marL="1371600" indent="0">
+              <a:buNone/>
+              <a:defRPr sz="675"/>
             </a:lvl5pPr>
-            <a:lvl6pPr marL="2286000" indent="0">
-              <a:buNone/>
-              <a:defRPr sz="900"/>
+            <a:lvl6pPr marL="1714500" indent="0">
+              <a:buNone/>
+              <a:defRPr sz="675"/>
             </a:lvl6pPr>
-            <a:lvl7pPr marL="2743200" indent="0">
-              <a:buNone/>
-              <a:defRPr sz="900"/>
+            <a:lvl7pPr marL="2057400" indent="0">
+              <a:buNone/>
+              <a:defRPr sz="675"/>
             </a:lvl7pPr>
-            <a:lvl8pPr marL="3200400" indent="0">
-              <a:buNone/>
-              <a:defRPr sz="900"/>
+            <a:lvl8pPr marL="2400300" indent="0">
+              <a:buNone/>
+              <a:defRPr sz="675"/>
             </a:lvl8pPr>
-            <a:lvl9pPr marL="3657600" indent="0">
-              <a:buNone/>
-              <a:defRPr sz="900"/>
+            <a:lvl9pPr marL="2743200" indent="0">
+              <a:buNone/>
+              <a:defRPr sz="675"/>
             </a:lvl9pPr>
           </a:lstStyle>
           <a:p>
             <a:pPr lvl="0"/>
             <a:r>
-              <a:rPr lang="en-US" smtClean="0"/>
+              <a:rPr lang="en-US"/>
               <a:t>Click to edit Master text styles</a:t>
             </a:r>
           </a:p>
@@ -2738,7 +2755,7 @@
           <a:p>
             <a:fld id="{241EB5C9-1307-BA42-ABA2-0BC069CD8E7F}" type="datetimeFigureOut">
               <a:rPr lang="en-US" smtClean="0"/>
-              <a:t>4/5/2019</a:t>
+              <a:t>1/2/22</a:t>
             </a:fld>
             <a:endParaRPr lang="en-US"/>
           </a:p>
@@ -2828,23 +2845,22 @@
         </p:nvSpPr>
         <p:spPr>
           <a:xfrm>
-            <a:off x="1792288" y="4800600"/>
-            <a:ext cx="5486400" cy="566738"/>
+            <a:off x="1792288" y="3600450"/>
+            <a:ext cx="5486400" cy="425054"/>
           </a:xfrm>
         </p:spPr>
         <p:txBody>
           <a:bodyPr anchor="b"/>
           <a:lstStyle>
             <a:lvl1pPr algn="l">
-              <a:defRPr sz="2000" b="1"/>
+              <a:defRPr sz="1500" b="1"/>
             </a:lvl1pPr>
           </a:lstStyle>
           <a:p>
             <a:r>
-              <a:rPr lang="en-US" smtClean="0"/>
+              <a:rPr lang="en-US"/>
               <a:t>Click to edit Master title style</a:t>
             </a:r>
-            <a:endParaRPr lang="en-US"/>
           </a:p>
         </p:txBody>
       </p:sp>
@@ -2860,8 +2876,8 @@
         </p:nvSpPr>
         <p:spPr>
           <a:xfrm>
-            <a:off x="1792288" y="612775"/>
-            <a:ext cx="5486400" cy="4114800"/>
+            <a:off x="1792288" y="459581"/>
+            <a:ext cx="5486400" cy="3086100"/>
           </a:xfrm>
         </p:spPr>
         <p:txBody>
@@ -2869,39 +2885,39 @@
           <a:lstStyle>
             <a:lvl1pPr marL="0" indent="0">
               <a:buNone/>
-              <a:defRPr sz="3200"/>
+              <a:defRPr sz="2400"/>
             </a:lvl1pPr>
-            <a:lvl2pPr marL="457200" indent="0">
-              <a:buNone/>
-              <a:defRPr sz="2800"/>
+            <a:lvl2pPr marL="342900" indent="0">
+              <a:buNone/>
+              <a:defRPr sz="2100"/>
             </a:lvl2pPr>
-            <a:lvl3pPr marL="914400" indent="0">
-              <a:buNone/>
-              <a:defRPr sz="2400"/>
+            <a:lvl3pPr marL="685800" indent="0">
+              <a:buNone/>
+              <a:defRPr sz="1800"/>
             </a:lvl3pPr>
-            <a:lvl4pPr marL="1371600" indent="0">
-              <a:buNone/>
-              <a:defRPr sz="2000"/>
+            <a:lvl4pPr marL="1028700" indent="0">
+              <a:buNone/>
+              <a:defRPr sz="1500"/>
             </a:lvl4pPr>
-            <a:lvl5pPr marL="1828800" indent="0">
-              <a:buNone/>
-              <a:defRPr sz="2000"/>
+            <a:lvl5pPr marL="1371600" indent="0">
+              <a:buNone/>
+              <a:defRPr sz="1500"/>
             </a:lvl5pPr>
-            <a:lvl6pPr marL="2286000" indent="0">
-              <a:buNone/>
-              <a:defRPr sz="2000"/>
+            <a:lvl6pPr marL="1714500" indent="0">
+              <a:buNone/>
+              <a:defRPr sz="1500"/>
             </a:lvl6pPr>
-            <a:lvl7pPr marL="2743200" indent="0">
-              <a:buNone/>
-              <a:defRPr sz="2000"/>
+            <a:lvl7pPr marL="2057400" indent="0">
+              <a:buNone/>
+              <a:defRPr sz="1500"/>
             </a:lvl7pPr>
-            <a:lvl8pPr marL="3200400" indent="0">
-              <a:buNone/>
-              <a:defRPr sz="2000"/>
+            <a:lvl8pPr marL="2400300" indent="0">
+              <a:buNone/>
+              <a:defRPr sz="1500"/>
             </a:lvl8pPr>
-            <a:lvl9pPr marL="3657600" indent="0">
-              <a:buNone/>
-              <a:defRPr sz="2000"/>
+            <a:lvl9pPr marL="2743200" indent="0">
+              <a:buNone/>
+              <a:defRPr sz="1500"/>
             </a:lvl9pPr>
           </a:lstStyle>
           <a:p>
@@ -2921,8 +2937,8 @@
         </p:nvSpPr>
         <p:spPr>
           <a:xfrm>
-            <a:off x="1792288" y="5367338"/>
-            <a:ext cx="5486400" cy="804862"/>
+            <a:off x="1792288" y="4025503"/>
+            <a:ext cx="5486400" cy="603647"/>
           </a:xfrm>
         </p:spPr>
         <p:txBody>
@@ -2930,45 +2946,45 @@
           <a:lstStyle>
             <a:lvl1pPr marL="0" indent="0">
               <a:buNone/>
-              <a:defRPr sz="1400"/>
+              <a:defRPr sz="1050"/>
             </a:lvl1pPr>
-            <a:lvl2pPr marL="457200" indent="0">
-              <a:buNone/>
-              <a:defRPr sz="1200"/>
+            <a:lvl2pPr marL="342900" indent="0">
+              <a:buNone/>
+              <a:defRPr sz="900"/>
             </a:lvl2pPr>
-            <a:lvl3pPr marL="914400" indent="0">
-              <a:buNone/>
-              <a:defRPr sz="1000"/>
+            <a:lvl3pPr marL="685800" indent="0">
+              <a:buNone/>
+              <a:defRPr sz="750"/>
             </a:lvl3pPr>
-            <a:lvl4pPr marL="1371600" indent="0">
-              <a:buNone/>
-              <a:defRPr sz="900"/>
+            <a:lvl4pPr marL="1028700" indent="0">
+              <a:buNone/>
+              <a:defRPr sz="675"/>
             </a:lvl4pPr>
-            <a:lvl5pPr marL="1828800" indent="0">
-              <a:buNone/>
-              <a:defRPr sz="900"/>
+            <a:lvl5pPr marL="1371600" indent="0">
+              <a:buNone/>
+              <a:defRPr sz="675"/>
             </a:lvl5pPr>
-            <a:lvl6pPr marL="2286000" indent="0">
-              <a:buNone/>
-              <a:defRPr sz="900"/>
+            <a:lvl6pPr marL="1714500" indent="0">
+              <a:buNone/>
+              <a:defRPr sz="675"/>
             </a:lvl6pPr>
-            <a:lvl7pPr marL="2743200" indent="0">
-              <a:buNone/>
-              <a:defRPr sz="900"/>
+            <a:lvl7pPr marL="2057400" indent="0">
+              <a:buNone/>
+              <a:defRPr sz="675"/>
             </a:lvl7pPr>
-            <a:lvl8pPr marL="3200400" indent="0">
-              <a:buNone/>
-              <a:defRPr sz="900"/>
+            <a:lvl8pPr marL="2400300" indent="0">
+              <a:buNone/>
+              <a:defRPr sz="675"/>
             </a:lvl8pPr>
-            <a:lvl9pPr marL="3657600" indent="0">
-              <a:buNone/>
-              <a:defRPr sz="900"/>
+            <a:lvl9pPr marL="2743200" indent="0">
+              <a:buNone/>
+              <a:defRPr sz="675"/>
             </a:lvl9pPr>
           </a:lstStyle>
           <a:p>
             <a:pPr lvl="0"/>
             <a:r>
-              <a:rPr lang="en-US" smtClean="0"/>
+              <a:rPr lang="en-US"/>
               <a:t>Click to edit Master text styles</a:t>
             </a:r>
           </a:p>
@@ -2991,7 +3007,7 @@
           <a:p>
             <a:fld id="{241EB5C9-1307-BA42-ABA2-0BC069CD8E7F}" type="datetimeFigureOut">
               <a:rPr lang="en-US" smtClean="0"/>
-              <a:t>4/5/2019</a:t>
+              <a:t>1/2/22</a:t>
             </a:fld>
             <a:endParaRPr lang="en-US"/>
           </a:p>
@@ -3053,7 +3069,7 @@
 </file>
 
 <file path=ppt/slideMasters/slideMaster1.xml><?xml version="1.0" encoding="utf-8"?>
-<p:sldMaster xmlns:a="http://schemas.openxmlformats.org/drawingml/2006/main" xmlns:r="http://schemas.openxmlformats.org/officeDocument/2006/relationships" xmlns:p="http://schemas.openxmlformats.org/presentationml/2006/main" preserve="1">
+<p:sldMaster xmlns:a="http://schemas.openxmlformats.org/drawingml/2006/main" xmlns:p="http://schemas.openxmlformats.org/presentationml/2006/main" xmlns:r="http://schemas.openxmlformats.org/officeDocument/2006/relationships" preserve="1">
   <p:cSld>
     <p:bg>
       <p:bgRef idx="1001">
@@ -3129,12 +3145,12 @@
               </a:spcAft>
               <a:defRPr/>
             </a:pPr>
-            <a:endParaRPr lang="de-DE" dirty="0">
+            <a:endParaRPr dirty="0" lang="de-DE">
               <a:solidFill>
                 <a:srgbClr val="FFFFFF"/>
               </a:solidFill>
-              <a:ea typeface="ＭＳ Ｐゴシック" pitchFamily="-105" charset="-128"/>
-              <a:cs typeface="ＭＳ Ｐゴシック" pitchFamily="-105" charset="-128"/>
+              <a:ea charset="-128" pitchFamily="-105" typeface="ＭＳ Ｐゴシック"/>
+              <a:cs charset="-128" pitchFamily="-105" typeface="ＭＳ Ｐゴシック"/>
             </a:endParaRPr>
           </a:p>
         </p:txBody>
@@ -3161,14 +3177,14 @@
           <a:prstGeom prst="line">
             <a:avLst/>
           </a:prstGeom>
-          <a:ln w="6350" cap="flat" cmpd="sng" algn="ctr">
+          <a:ln algn="ctr" cap="flat" cmpd="sng" w="6350">
             <a:solidFill>
               <a:schemeClr val="tx1"/>
             </a:solidFill>
             <a:prstDash val="solid"/>
             <a:round/>
-            <a:headEnd type="none" w="med" len="med"/>
-            <a:tailEnd type="none" w="med" len="med"/>
+            <a:headEnd len="med" type="none" w="med"/>
+            <a:tailEnd len="med" type="none" w="med"/>
           </a:ln>
           <a:effectLst/>
         </p:spPr>
@@ -3207,7 +3223,7 @@
           </a:prstGeom>
         </p:spPr>
         <p:txBody>
-          <a:bodyPr vert="horz" lIns="91440" tIns="45720" rIns="91440" bIns="45720" rtlCol="0" anchor="ctr">
+          <a:bodyPr anchor="ctr" bIns="45720" lIns="91440" rIns="91440" rtlCol="0" tIns="45720" vert="horz">
             <a:noAutofit/>
           </a:bodyPr>
           <a:lstStyle/>
@@ -3226,7 +3242,7 @@
             <a:spLocks noGrp="1"/>
           </p:cNvSpPr>
           <p:nvPr userDrawn="1">
-            <p:ph type="body" idx="1"/>
+            <p:ph idx="1" type="body"/>
           </p:nvPr>
         </p:nvSpPr>
         <p:spPr>
@@ -3239,42 +3255,42 @@
           </a:prstGeom>
         </p:spPr>
         <p:txBody>
-          <a:bodyPr vert="horz" lIns="91440" tIns="45720" rIns="91440" bIns="45720" rtlCol="0">
+          <a:bodyPr bIns="45720" lIns="91440" rIns="91440" rtlCol="0" tIns="45720" vert="horz">
             <a:normAutofit/>
           </a:bodyPr>
           <a:lstStyle/>
           <a:p>
             <a:pPr lvl="0"/>
             <a:r>
-              <a:rPr lang="en-US" dirty="0"/>
+              <a:rPr dirty="0" lang="en-US"/>
               <a:t>Click to edit Master text styles</a:t>
             </a:r>
           </a:p>
           <a:p>
             <a:pPr lvl="1"/>
             <a:r>
-              <a:rPr lang="en-US" dirty="0"/>
+              <a:rPr dirty="0" lang="en-US"/>
               <a:t>Second level</a:t>
             </a:r>
           </a:p>
           <a:p>
             <a:pPr lvl="2"/>
             <a:r>
-              <a:rPr lang="en-US" dirty="0"/>
+              <a:rPr dirty="0" lang="en-US"/>
               <a:t>Third level</a:t>
             </a:r>
           </a:p>
           <a:p>
             <a:pPr lvl="3"/>
             <a:r>
-              <a:rPr lang="en-US" dirty="0"/>
+              <a:rPr dirty="0" lang="en-US"/>
               <a:t>Fourth level</a:t>
             </a:r>
           </a:p>
           <a:p>
             <a:pPr lvl="4"/>
             <a:r>
-              <a:rPr lang="en-US" dirty="0"/>
+              <a:rPr dirty="0" lang="en-US"/>
               <a:t>Fifth level</a:t>
             </a:r>
           </a:p>
@@ -3287,7 +3303,7 @@
             <a:spLocks noGrp="1"/>
           </p:cNvSpPr>
           <p:nvPr userDrawn="1">
-            <p:ph type="dt" sz="half" idx="2"/>
+            <p:ph idx="2" sz="half" type="dt"/>
           </p:nvPr>
         </p:nvSpPr>
         <p:spPr>
@@ -3300,15 +3316,15 @@
           </a:prstGeom>
         </p:spPr>
         <p:txBody>
-          <a:bodyPr vert="horz" lIns="91440" tIns="45720" rIns="91440" bIns="45720" rtlCol="0" anchor="ctr"/>
+          <a:bodyPr anchor="ctr" bIns="45720" lIns="91440" rIns="91440" rtlCol="0" tIns="45720" vert="horz"/>
           <a:lstStyle>
             <a:lvl1pPr algn="ctr">
               <a:defRPr sz="1200">
                 <a:solidFill>
                   <a:schemeClr val="bg1"/>
                 </a:solidFill>
-                <a:latin typeface="Arial" panose="020B0604020202020204" pitchFamily="34" charset="0"/>
-                <a:cs typeface="Arial" panose="020B0604020202020204" pitchFamily="34" charset="0"/>
+                <a:latin charset="0" panose="020B0604020202020204" pitchFamily="34" typeface="Arial"/>
+                <a:cs charset="0" panose="020B0604020202020204" pitchFamily="34" typeface="Arial"/>
               </a:defRPr>
             </a:lvl1pPr>
           </a:lstStyle>
@@ -3318,7 +3334,7 @@
               <a:pPr/>
               <a:t>02.06.21</a:t>
             </a:fld>
-            <a:endParaRPr lang="en-US" dirty="0"/>
+            <a:endParaRPr dirty="0" lang="en-US"/>
           </a:p>
         </p:txBody>
       </p:sp>
@@ -3335,7 +3351,7 @@
             <a:spLocks noGrp="1"/>
           </p:cNvSpPr>
           <p:nvPr>
-            <p:ph type="sldNum" sz="quarter" idx="4"/>
+            <p:ph idx="4" sz="quarter" type="sldNum"/>
           </p:nvPr>
         </p:nvSpPr>
         <p:spPr>
@@ -3348,15 +3364,15 @@
           </a:prstGeom>
         </p:spPr>
         <p:txBody>
-          <a:bodyPr vert="horz" lIns="91440" tIns="45720" rIns="91440" bIns="45720" rtlCol="0" anchor="ctr"/>
+          <a:bodyPr anchor="ctr" bIns="45720" lIns="91440" rIns="91440" rtlCol="0" tIns="45720" vert="horz"/>
           <a:lstStyle>
             <a:lvl1pPr algn="ctr">
               <a:defRPr sz="1200">
                 <a:solidFill>
                   <a:schemeClr val="bg1"/>
                 </a:solidFill>
-                <a:latin typeface="Arial" panose="020B0604020202020204" pitchFamily="34" charset="0"/>
-                <a:cs typeface="Arial" panose="020B0604020202020204" pitchFamily="34" charset="0"/>
+                <a:latin charset="0" panose="020B0604020202020204" pitchFamily="34" typeface="Arial"/>
+                <a:cs charset="0" panose="020B0604020202020204" pitchFamily="34" typeface="Arial"/>
               </a:defRPr>
             </a:lvl1pPr>
           </a:lstStyle>
@@ -3366,13 +3382,13 @@
               <a:pPr/>
               <a:t>‹Nr.›</a:t>
             </a:fld>
-            <a:endParaRPr lang="en-GB" dirty="0"/>
+            <a:endParaRPr dirty="0" lang="en-GB"/>
           </a:p>
         </p:txBody>
       </p:sp>
       <p:pic>
         <p:nvPicPr>
-          <p:cNvPr id="8" name="Grafik 7" descr="Ein Bild, das Text, ClipArt enthält.&#10;&#10;Automatisch generierte Beschreibung">
+          <p:cNvPr descr="Ein Bild, das Text, ClipArt enthält.  Automatisch generierte Beschreibung" id="8" name="Grafik 7">
             <a:extLst>
               <a:ext uri="{FF2B5EF4-FFF2-40B4-BE49-F238E27FC236}">
                 <a16:creationId xmlns:a16="http://schemas.microsoft.com/office/drawing/2014/main" id="{1D7B79BC-A195-E94F-AA6F-F1229882FD2D}"/>
@@ -3402,7 +3418,7 @@
       </p:pic>
       <p:pic>
         <p:nvPicPr>
-          <p:cNvPr id="11" name="Grafik 10" descr="Ein Bild, das Text enthält.&#10;&#10;Automatisch generierte Beschreibung">
+          <p:cNvPr descr="Ein Bild, das Text enthält.  Automatisch generierte Beschreibung" id="11" name="Grafik 10">
             <a:extLst>
               <a:ext uri="{FF2B5EF4-FFF2-40B4-BE49-F238E27FC236}">
                 <a16:creationId xmlns:a16="http://schemas.microsoft.com/office/drawing/2014/main" id="{D58B9428-5BA9-314B-9FC0-2C6888D53F9F}"/>
@@ -3437,7 +3453,7 @@
       </p:ext>
     </p:extLst>
   </p:cSld>
-  <p:clrMap bg1="lt1" tx1="dk1" bg2="lt2" tx2="dk2" accent1="accent1" accent2="accent2" accent3="accent3" accent4="accent4" accent5="accent5" accent6="accent6" hlink="hlink" folHlink="folHlink"/>
+  <p:clrMap accent1="accent1" accent2="accent2" accent3="accent3" accent4="accent4" accent5="accent5" accent6="accent6" bg1="lt1" bg2="lt2" folHlink="folHlink" hlink="hlink" tx1="dk1" tx2="dk2"/>
   <p:sldLayoutIdLst>
     <p:sldLayoutId id="2147483655" r:id="rId1"/>
     <p:sldLayoutId id="2147483650" r:id="rId2"/>
@@ -3445,108 +3461,110 @@
     <p:sldLayoutId id="2147483652" r:id="rId4"/>
     <p:sldLayoutId id="2147483653" r:id="rId5"/>
     <p:sldLayoutId id="2147483654" r:id="rId6"/>
+    <p:sldLayoutId id="2147483657" r:id="rId11"/>
+    <p:sldLayoutId id="2147483656" r:id="rId10"/>
   </p:sldLayoutIdLst>
-  <p:hf hdr="0" ftr="0"/>
+  <p:hf ftr="0" hdr="0"/>
   <p:txStyles>
     <p:titleStyle>
-      <a:lvl1pPr algn="l" defTabSz="380985" rtl="0" eaLnBrk="1" latinLnBrk="0" hangingPunct="1">
+      <a:lvl1pPr algn="l" defTabSz="380985" eaLnBrk="1" hangingPunct="1" latinLnBrk="0" rtl="0">
         <a:spcBef>
           <a:spcPct val="0"/>
         </a:spcBef>
         <a:buNone/>
-        <a:defRPr sz="2000" kern="1200">
+        <a:defRPr kern="1200" sz="2000">
           <a:solidFill>
             <a:schemeClr val="tx1"/>
           </a:solidFill>
-          <a:latin typeface="Arial" panose="020B0604020202020204" pitchFamily="34" charset="0"/>
+          <a:latin charset="0" panose="020B0604020202020204" pitchFamily="34" typeface="Arial"/>
           <a:ea typeface="+mj-ea"/>
-          <a:cs typeface="Arial" panose="020B0604020202020204" pitchFamily="34" charset="0"/>
+          <a:cs charset="0" panose="020B0604020202020204" pitchFamily="34" typeface="Arial"/>
         </a:defRPr>
       </a:lvl1pPr>
     </p:titleStyle>
     <p:bodyStyle>
-      <a:lvl1pPr marL="285739" indent="-285739" algn="l" defTabSz="380985" rtl="0" eaLnBrk="1" latinLnBrk="0" hangingPunct="1">
+      <a:lvl1pPr algn="l" defTabSz="380985" eaLnBrk="1" hangingPunct="1" indent="-285739" latinLnBrk="0" marL="285739" rtl="0">
         <a:spcBef>
           <a:spcPct val="20000"/>
         </a:spcBef>
         <a:buFont typeface="Arial"/>
         <a:buChar char="•"/>
-        <a:defRPr sz="2000" kern="1200">
+        <a:defRPr kern="1200" sz="2000">
           <a:solidFill>
             <a:schemeClr val="tx1"/>
           </a:solidFill>
-          <a:latin typeface="Arial" panose="020B0604020202020204" pitchFamily="34" charset="0"/>
+          <a:latin charset="0" panose="020B0604020202020204" pitchFamily="34" typeface="Arial"/>
           <a:ea typeface="+mn-ea"/>
-          <a:cs typeface="Arial" panose="020B0604020202020204" pitchFamily="34" charset="0"/>
+          <a:cs charset="0" panose="020B0604020202020204" pitchFamily="34" typeface="Arial"/>
         </a:defRPr>
       </a:lvl1pPr>
-      <a:lvl2pPr marL="619100" indent="-238115" algn="l" defTabSz="380985" rtl="0" eaLnBrk="1" latinLnBrk="0" hangingPunct="1">
+      <a:lvl2pPr algn="l" defTabSz="380985" eaLnBrk="1" hangingPunct="1" indent="-238115" latinLnBrk="0" marL="619100" rtl="0">
         <a:spcBef>
           <a:spcPct val="20000"/>
         </a:spcBef>
         <a:buFont typeface="Arial"/>
         <a:buChar char="–"/>
-        <a:defRPr sz="1800" kern="1200">
+        <a:defRPr kern="1200" sz="1800">
           <a:solidFill>
             <a:schemeClr val="tx1"/>
           </a:solidFill>
-          <a:latin typeface="Arial" panose="020B0604020202020204" pitchFamily="34" charset="0"/>
+          <a:latin charset="0" panose="020B0604020202020204" pitchFamily="34" typeface="Arial"/>
           <a:ea typeface="+mn-ea"/>
-          <a:cs typeface="Arial" panose="020B0604020202020204" pitchFamily="34" charset="0"/>
+          <a:cs charset="0" panose="020B0604020202020204" pitchFamily="34" typeface="Arial"/>
         </a:defRPr>
       </a:lvl2pPr>
-      <a:lvl3pPr marL="952462" indent="-190492" algn="l" defTabSz="380985" rtl="0" eaLnBrk="1" latinLnBrk="0" hangingPunct="1">
+      <a:lvl3pPr algn="l" defTabSz="380985" eaLnBrk="1" hangingPunct="1" indent="-190492" latinLnBrk="0" marL="952462" rtl="0">
         <a:spcBef>
           <a:spcPct val="20000"/>
         </a:spcBef>
         <a:buFont typeface="Arial"/>
         <a:buChar char="•"/>
-        <a:defRPr sz="1600" kern="1200">
+        <a:defRPr kern="1200" sz="1600">
           <a:solidFill>
             <a:schemeClr val="tx1"/>
           </a:solidFill>
-          <a:latin typeface="Arial" panose="020B0604020202020204" pitchFamily="34" charset="0"/>
+          <a:latin charset="0" panose="020B0604020202020204" pitchFamily="34" typeface="Arial"/>
           <a:ea typeface="+mn-ea"/>
-          <a:cs typeface="Arial" panose="020B0604020202020204" pitchFamily="34" charset="0"/>
+          <a:cs charset="0" panose="020B0604020202020204" pitchFamily="34" typeface="Arial"/>
         </a:defRPr>
       </a:lvl3pPr>
-      <a:lvl4pPr marL="1333447" indent="-190492" algn="l" defTabSz="380985" rtl="0" eaLnBrk="1" latinLnBrk="0" hangingPunct="1">
+      <a:lvl4pPr algn="l" defTabSz="380985" eaLnBrk="1" hangingPunct="1" indent="-190492" latinLnBrk="0" marL="1333447" rtl="0">
         <a:spcBef>
           <a:spcPct val="20000"/>
         </a:spcBef>
         <a:buFont typeface="Arial"/>
         <a:buChar char="–"/>
-        <a:defRPr sz="1400" kern="1200">
+        <a:defRPr kern="1200" sz="1400">
           <a:solidFill>
             <a:schemeClr val="tx1"/>
           </a:solidFill>
-          <a:latin typeface="Arial" panose="020B0604020202020204" pitchFamily="34" charset="0"/>
+          <a:latin charset="0" panose="020B0604020202020204" pitchFamily="34" typeface="Arial"/>
           <a:ea typeface="+mn-ea"/>
-          <a:cs typeface="Arial" panose="020B0604020202020204" pitchFamily="34" charset="0"/>
+          <a:cs charset="0" panose="020B0604020202020204" pitchFamily="34" typeface="Arial"/>
         </a:defRPr>
       </a:lvl4pPr>
-      <a:lvl5pPr marL="1714431" indent="-190492" algn="l" defTabSz="380985" rtl="0" eaLnBrk="1" latinLnBrk="0" hangingPunct="1">
+      <a:lvl5pPr algn="l" defTabSz="380985" eaLnBrk="1" hangingPunct="1" indent="-190492" latinLnBrk="0" marL="1714431" rtl="0">
         <a:spcBef>
           <a:spcPct val="20000"/>
         </a:spcBef>
         <a:buFont typeface="Arial"/>
         <a:buChar char="»"/>
-        <a:defRPr sz="1400" kern="1200">
+        <a:defRPr kern="1200" sz="1400">
           <a:solidFill>
             <a:schemeClr val="tx1"/>
           </a:solidFill>
-          <a:latin typeface="Arial" panose="020B0604020202020204" pitchFamily="34" charset="0"/>
+          <a:latin charset="0" panose="020B0604020202020204" pitchFamily="34" typeface="Arial"/>
           <a:ea typeface="+mn-ea"/>
-          <a:cs typeface="Arial" panose="020B0604020202020204" pitchFamily="34" charset="0"/>
+          <a:cs charset="0" panose="020B0604020202020204" pitchFamily="34" typeface="Arial"/>
         </a:defRPr>
       </a:lvl5pPr>
-      <a:lvl6pPr marL="2095416" indent="-190492" algn="l" defTabSz="380985" rtl="0" eaLnBrk="1" latinLnBrk="0" hangingPunct="1">
+      <a:lvl6pPr algn="l" defTabSz="380985" eaLnBrk="1" hangingPunct="1" indent="-190492" latinLnBrk="0" marL="2095416" rtl="0">
         <a:spcBef>
           <a:spcPct val="20000"/>
         </a:spcBef>
         <a:buFont typeface="Arial"/>
         <a:buChar char="•"/>
-        <a:defRPr sz="1667" kern="1200">
+        <a:defRPr kern="1200" sz="1667">
           <a:solidFill>
             <a:schemeClr val="tx1"/>
           </a:solidFill>
@@ -3555,13 +3573,13 @@
           <a:cs typeface="+mn-cs"/>
         </a:defRPr>
       </a:lvl6pPr>
-      <a:lvl7pPr marL="2476401" indent="-190492" algn="l" defTabSz="380985" rtl="0" eaLnBrk="1" latinLnBrk="0" hangingPunct="1">
+      <a:lvl7pPr algn="l" defTabSz="380985" eaLnBrk="1" hangingPunct="1" indent="-190492" latinLnBrk="0" marL="2476401" rtl="0">
         <a:spcBef>
           <a:spcPct val="20000"/>
         </a:spcBef>
         <a:buFont typeface="Arial"/>
         <a:buChar char="•"/>
-        <a:defRPr sz="1667" kern="1200">
+        <a:defRPr kern="1200" sz="1667">
           <a:solidFill>
             <a:schemeClr val="tx1"/>
           </a:solidFill>
@@ -3570,13 +3588,13 @@
           <a:cs typeface="+mn-cs"/>
         </a:defRPr>
       </a:lvl7pPr>
-      <a:lvl8pPr marL="2857386" indent="-190492" algn="l" defTabSz="380985" rtl="0" eaLnBrk="1" latinLnBrk="0" hangingPunct="1">
+      <a:lvl8pPr algn="l" defTabSz="380985" eaLnBrk="1" hangingPunct="1" indent="-190492" latinLnBrk="0" marL="2857386" rtl="0">
         <a:spcBef>
           <a:spcPct val="20000"/>
         </a:spcBef>
         <a:buFont typeface="Arial"/>
         <a:buChar char="•"/>
-        <a:defRPr sz="1667" kern="1200">
+        <a:defRPr kern="1200" sz="1667">
           <a:solidFill>
             <a:schemeClr val="tx1"/>
           </a:solidFill>
@@ -3585,13 +3603,13 @@
           <a:cs typeface="+mn-cs"/>
         </a:defRPr>
       </a:lvl8pPr>
-      <a:lvl9pPr marL="3238370" indent="-190492" algn="l" defTabSz="380985" rtl="0" eaLnBrk="1" latinLnBrk="0" hangingPunct="1">
+      <a:lvl9pPr algn="l" defTabSz="380985" eaLnBrk="1" hangingPunct="1" indent="-190492" latinLnBrk="0" marL="3238370" rtl="0">
         <a:spcBef>
           <a:spcPct val="20000"/>
         </a:spcBef>
         <a:buFont typeface="Arial"/>
         <a:buChar char="•"/>
-        <a:defRPr sz="1667" kern="1200">
+        <a:defRPr kern="1200" sz="1667">
           <a:solidFill>
             <a:schemeClr val="tx1"/>
           </a:solidFill>
@@ -3605,8 +3623,8 @@
       <a:defPPr>
         <a:defRPr lang="en-US"/>
       </a:defPPr>
-      <a:lvl1pPr marL="0" algn="l" defTabSz="380985" rtl="0" eaLnBrk="1" latinLnBrk="0" hangingPunct="1">
-        <a:defRPr sz="1500" kern="1200">
+      <a:lvl1pPr algn="l" defTabSz="380985" eaLnBrk="1" hangingPunct="1" latinLnBrk="0" marL="0" rtl="0">
+        <a:defRPr kern="1200" sz="1500">
           <a:solidFill>
             <a:schemeClr val="tx1"/>
           </a:solidFill>
@@ -3615,8 +3633,8 @@
           <a:cs typeface="+mn-cs"/>
         </a:defRPr>
       </a:lvl1pPr>
-      <a:lvl2pPr marL="380985" algn="l" defTabSz="380985" rtl="0" eaLnBrk="1" latinLnBrk="0" hangingPunct="1">
-        <a:defRPr sz="1500" kern="1200">
+      <a:lvl2pPr algn="l" defTabSz="380985" eaLnBrk="1" hangingPunct="1" latinLnBrk="0" marL="380985" rtl="0">
+        <a:defRPr kern="1200" sz="1500">
           <a:solidFill>
             <a:schemeClr val="tx1"/>
           </a:solidFill>
@@ -3625,8 +3643,8 @@
           <a:cs typeface="+mn-cs"/>
         </a:defRPr>
       </a:lvl2pPr>
-      <a:lvl3pPr marL="761970" algn="l" defTabSz="380985" rtl="0" eaLnBrk="1" latinLnBrk="0" hangingPunct="1">
-        <a:defRPr sz="1500" kern="1200">
+      <a:lvl3pPr algn="l" defTabSz="380985" eaLnBrk="1" hangingPunct="1" latinLnBrk="0" marL="761970" rtl="0">
+        <a:defRPr kern="1200" sz="1500">
           <a:solidFill>
             <a:schemeClr val="tx1"/>
           </a:solidFill>
@@ -3635,8 +3653,8 @@
           <a:cs typeface="+mn-cs"/>
         </a:defRPr>
       </a:lvl3pPr>
-      <a:lvl4pPr marL="1142954" algn="l" defTabSz="380985" rtl="0" eaLnBrk="1" latinLnBrk="0" hangingPunct="1">
-        <a:defRPr sz="1500" kern="1200">
+      <a:lvl4pPr algn="l" defTabSz="380985" eaLnBrk="1" hangingPunct="1" latinLnBrk="0" marL="1142954" rtl="0">
+        <a:defRPr kern="1200" sz="1500">
           <a:solidFill>
             <a:schemeClr val="tx1"/>
           </a:solidFill>
@@ -3645,8 +3663,8 @@
           <a:cs typeface="+mn-cs"/>
         </a:defRPr>
       </a:lvl4pPr>
-      <a:lvl5pPr marL="1523939" algn="l" defTabSz="380985" rtl="0" eaLnBrk="1" latinLnBrk="0" hangingPunct="1">
-        <a:defRPr sz="1500" kern="1200">
+      <a:lvl5pPr algn="l" defTabSz="380985" eaLnBrk="1" hangingPunct="1" latinLnBrk="0" marL="1523939" rtl="0">
+        <a:defRPr kern="1200" sz="1500">
           <a:solidFill>
             <a:schemeClr val="tx1"/>
           </a:solidFill>
@@ -3655,8 +3673,8 @@
           <a:cs typeface="+mn-cs"/>
         </a:defRPr>
       </a:lvl5pPr>
-      <a:lvl6pPr marL="1904924" algn="l" defTabSz="380985" rtl="0" eaLnBrk="1" latinLnBrk="0" hangingPunct="1">
-        <a:defRPr sz="1500" kern="1200">
+      <a:lvl6pPr algn="l" defTabSz="380985" eaLnBrk="1" hangingPunct="1" latinLnBrk="0" marL="1904924" rtl="0">
+        <a:defRPr kern="1200" sz="1500">
           <a:solidFill>
             <a:schemeClr val="tx1"/>
           </a:solidFill>
@@ -3665,8 +3683,8 @@
           <a:cs typeface="+mn-cs"/>
         </a:defRPr>
       </a:lvl6pPr>
-      <a:lvl7pPr marL="2285909" algn="l" defTabSz="380985" rtl="0" eaLnBrk="1" latinLnBrk="0" hangingPunct="1">
-        <a:defRPr sz="1500" kern="1200">
+      <a:lvl7pPr algn="l" defTabSz="380985" eaLnBrk="1" hangingPunct="1" latinLnBrk="0" marL="2285909" rtl="0">
+        <a:defRPr kern="1200" sz="1500">
           <a:solidFill>
             <a:schemeClr val="tx1"/>
           </a:solidFill>
@@ -3675,8 +3693,8 @@
           <a:cs typeface="+mn-cs"/>
         </a:defRPr>
       </a:lvl7pPr>
-      <a:lvl8pPr marL="2666893" algn="l" defTabSz="380985" rtl="0" eaLnBrk="1" latinLnBrk="0" hangingPunct="1">
-        <a:defRPr sz="1500" kern="1200">
+      <a:lvl8pPr algn="l" defTabSz="380985" eaLnBrk="1" hangingPunct="1" latinLnBrk="0" marL="2666893" rtl="0">
+        <a:defRPr kern="1200" sz="1500">
           <a:solidFill>
             <a:schemeClr val="tx1"/>
           </a:solidFill>
@@ -3685,8 +3703,8 @@
           <a:cs typeface="+mn-cs"/>
         </a:defRPr>
       </a:lvl8pPr>
-      <a:lvl9pPr marL="3047878" algn="l" defTabSz="380985" rtl="0" eaLnBrk="1" latinLnBrk="0" hangingPunct="1">
-        <a:defRPr sz="1500" kern="1200">
+      <a:lvl9pPr algn="l" defTabSz="380985" eaLnBrk="1" hangingPunct="1" latinLnBrk="0" marL="3047878" rtl="0">
+        <a:defRPr kern="1200" sz="1500">
           <a:solidFill>
             <a:schemeClr val="tx1"/>
           </a:solidFill>
@@ -3729,44 +3747,20 @@
         </p:nvSpPr>
         <p:spPr>
           <a:xfrm>
-            <a:off x="726621" y="935302"/>
-            <a:ext cx="7274379" cy="1989667"/>
+            <a:off x="685800" y="1597819"/>
+            <a:ext cx="7772400" cy="1102519"/>
           </a:xfrm>
         </p:spPr>
         <p:txBody>
           <a:bodyPr/>
           <a:lstStyle/>
           <a:p>
-            <a:pPr lvl="0" marL="0" indent="0">
+            <a:pPr lvl="0" indent="0" marL="0">
               <a:buNone/>
             </a:pPr>
             <a:r>
               <a:rPr/>
-              <a:t>Presentation</a:t>
-            </a:r>
-            <a:r>
-              <a:rPr/>
-              <a:t> </a:t>
-            </a:r>
-            <a:r>
-              <a:rPr/>
-              <a:t>title</a:t>
-            </a:r>
-            <a:r>
-              <a:rPr/>
-              <a:t> </a:t>
-            </a:r>
-            <a:r>
-              <a:rPr/>
-              <a:t>(Update</a:t>
-            </a:r>
-            <a:r>
-              <a:rPr/>
-              <a:t> </a:t>
-            </a:r>
-            <a:r>
-              <a:rPr/>
-              <a:t>18.06.2021)</a:t>
+              <a:t>presentation</a:t>
             </a:r>
           </a:p>
         </p:txBody>
@@ -3778,53 +3772,39 @@
             <a:spLocks noGrp="1"/>
           </p:cNvSpPr>
           <p:nvPr>
-            <p:ph type="subTitle" idx="1"/>
+            <p:ph idx="1" type="subTitle"/>
           </p:nvPr>
         </p:nvSpPr>
         <p:spPr>
           <a:xfrm>
-            <a:off x="726621" y="3001698"/>
-            <a:ext cx="7274379" cy="1379802"/>
+            <a:off x="1371600" y="2914650"/>
+            <a:ext cx="6400800" cy="1314450"/>
           </a:xfrm>
         </p:spPr>
         <p:txBody>
           <a:bodyPr/>
           <a:lstStyle/>
           <a:p>
-            <a:pPr lvl="0" marL="0" indent="0">
+            <a:pPr lvl="0" indent="0" marL="0">
               <a:buNone/>
             </a:pPr>
             <a:br/>
             <a:br/>
             <a:r>
               <a:rPr/>
-              <a:t>Cornelius</a:t>
-            </a:r>
-            <a:r>
-              <a:rPr/>
-              <a:t> </a:t>
-            </a:r>
-            <a:r>
-              <a:rPr/>
-              <a:t>Hennch</a:t>
-            </a:r>
-          </a:p>
-        </p:txBody>
-      </p:sp>
-      <p:sp>
-        <p:nvSpPr>
-          <p:cNvPr id="4" name="Datumsplatzhalter 3">
-            <a:extLst>
-              <a:ext uri="{FF2B5EF4-FFF2-40B4-BE49-F238E27FC236}">
-                <a16:creationId xmlns:a16="http://schemas.microsoft.com/office/drawing/2014/main" id="{EFA66E54-C5DF-2A42-823E-BB2E1565128A}"/>
-              </a:ext>
-            </a:extLst>
-          </p:cNvPr>
-          <p:cNvSpPr>
-            <a:spLocks noGrp="1"/>
-          </p:cNvSpPr>
-          <p:nvPr>
-            <p:ph type="dt" sz="half" idx="10"/>
+              <a:t>Cornelius Hennch</a:t>
+            </a:r>
+          </a:p>
+        </p:txBody>
+      </p:sp>
+      <p:sp>
+        <p:nvSpPr>
+          <p:cNvPr id="4" name="Date Placeholder 3"/>
+          <p:cNvSpPr>
+            <a:spLocks noGrp="1"/>
+          </p:cNvSpPr>
+          <p:nvPr>
+            <p:ph idx="10" sz="half" type="dt"/>
           </p:nvPr>
         </p:nvSpPr>
         <p:spPr/>
@@ -3832,13 +3812,34 @@
           <a:bodyPr/>
           <a:lstStyle/>
           <a:p>
-            <a:pPr lvl="0" marL="0" indent="0">
-              <a:buNone/>
-            </a:pPr>
-            <a:r>
-              <a:rPr/>
-              <a:t>18.06.2021</a:t>
-            </a:r>
+            <a:fld id="{241EB5C9-1307-BA42-ABA2-0BC069CD8E7F}" type="datetimeFigureOut">
+              <a:rPr lang="en-US" smtClean="0"/>
+              <a:t>2025-03-14</a:t>
+            </a:fld>
+            <a:endParaRPr lang="en-US"/>
+          </a:p>
+        </p:txBody>
+      </p:sp>
+      <p:sp>
+        <p:nvSpPr>
+          <p:cNvPr id="6" name="Slide Number Placeholder 5"/>
+          <p:cNvSpPr>
+            <a:spLocks noGrp="1"/>
+          </p:cNvSpPr>
+          <p:nvPr>
+            <p:ph idx="12" sz="quarter" type="sldNum"/>
+          </p:nvPr>
+        </p:nvSpPr>
+        <p:spPr/>
+        <p:txBody>
+          <a:bodyPr/>
+          <a:lstStyle/>
+          <a:p>
+            <a:fld id="{C5EF2332-01BF-834F-8236-50238282D533}" type="slidenum">
+              <a:rPr lang="en-US" smtClean="0"/>
+              <a:t>‹#›</a:t>
+            </a:fld>
+            <a:endParaRPr lang="en-US"/>
           </a:p>
         </p:txBody>
       </p:sp>
@@ -3879,48 +3880,82 @@
           <a:bodyPr/>
           <a:lstStyle/>
           <a:p>
-            <a:pPr lvl="0" marL="0" indent="0">
+            <a:pPr lvl="0" indent="0" marL="0">
               <a:buNone/>
             </a:pPr>
             <a:r>
               <a:rPr/>
-              <a:t>Slide</a:t>
-            </a:r>
+              <a:t>R Markdown</a:t>
+            </a:r>
+          </a:p>
+        </p:txBody>
+      </p:sp>
+      <p:sp>
+        <p:nvSpPr>
+          <p:cNvPr id="3" name="Content Placeholder 2"/>
+          <p:cNvSpPr>
+            <a:spLocks noGrp="1"/>
+          </p:cNvSpPr>
+          <p:nvPr>
+            <p:ph idx="1"/>
+          </p:nvPr>
+        </p:nvSpPr>
+        <p:spPr/>
+        <p:txBody>
+          <a:bodyPr/>
+          <a:lstStyle/>
+          <a:p>
+            <a:pPr lvl="0" indent="0" marL="0">
+              <a:buNone/>
+            </a:pPr>
             <a:r>
               <a:rPr/>
-              <a:t> </a:t>
+              <a:t>This is an R Markdown presentation. Markdown is a simple formatting syntax for authoring HTML, PDF, and MS Word documents. For more details on using R Markdown see </a:t>
+            </a:r>
+            <a:r>
+              <a:rPr>
+                <a:hlinkClick r:id="rId2"/>
+              </a:rPr>
+              <a:t>http://rmarkdown.rstudio.com</a:t>
             </a:r>
             <a:r>
               <a:rPr/>
-              <a:t>with</a:t>
-            </a:r>
+              <a:t>.</a:t>
+            </a:r>
+          </a:p>
+          <a:p>
+            <a:pPr lvl="0" indent="0" marL="0">
+              <a:buNone/>
+            </a:pPr>
             <a:r>
               <a:rPr/>
-              <a:t> </a:t>
+              <a:t>When you click the </a:t>
+            </a:r>
+            <a:r>
+              <a:rPr b="1"/>
+              <a:t>Knit</a:t>
             </a:r>
             <a:r>
               <a:rPr/>
-              <a:t>multiple</a:t>
-            </a:r>
-            <a:r>
-              <a:rPr/>
-              <a:t> </a:t>
-            </a:r>
-            <a:r>
-              <a:rPr/>
-              <a:t>points</a:t>
-            </a:r>
-          </a:p>
-        </p:txBody>
-      </p:sp>
-      <p:sp>
-        <p:nvSpPr>
-          <p:cNvPr id="3" name="Content Placeholder 2"/>
-          <p:cNvSpPr>
-            <a:spLocks noGrp="1"/>
-          </p:cNvSpPr>
-          <p:nvPr>
-            <p:ph idx="1"/>
+              <a:t> button a document will be generated that includes both content as well as the output of any embedded R code chunks within the document.</a:t>
+            </a:r>
+          </a:p>
+        </p:txBody>
+      </p:sp>
+      <p:sp>
+        <p:nvSpPr>
+          <p:cNvPr id="7" name="Datumsplatzhalter 6">
+            <a:extLst>
+              <a:ext uri="{FF2B5EF4-FFF2-40B4-BE49-F238E27FC236}">
+                <a16:creationId xmlns:a16="http://schemas.microsoft.com/office/drawing/2014/main" id="{F11C80C7-74DE-4443-BAC3-F53DC65E7ED2}"/>
+              </a:ext>
+            </a:extLst>
+          </p:cNvPr>
+          <p:cNvSpPr>
+            <a:spLocks noGrp="1"/>
+          </p:cNvSpPr>
+          <p:nvPr>
+            <p:ph idx="10" sz="half" type="dt"/>
           </p:nvPr>
         </p:nvSpPr>
         <p:spPr/>
@@ -3928,31 +3963,41 @@
           <a:bodyPr/>
           <a:lstStyle/>
           <a:p>
-            <a:pPr lvl="1">
-              <a:buAutoNum type="arabicPeriod"/>
-            </a:pPr>
-            <a:r>
-              <a:rPr/>
-              <a:t>Filter lesions &gt; 10% prevalence</a:t>
-            </a:r>
-          </a:p>
-          <a:p>
-            <a:pPr lvl="1">
-              <a:buAutoNum type="arabicPeriod"/>
-            </a:pPr>
-            <a:r>
-              <a:rPr/>
-              <a:t>Create crosstables for binary outcome variables (add p-/q-values)</a:t>
-            </a:r>
-          </a:p>
-          <a:p>
-            <a:pPr lvl="1">
-              <a:buAutoNum type="arabicPeriod"/>
-            </a:pPr>
-            <a:r>
-              <a:rPr/>
-              <a:t>Logistic Regression</a:t>
-            </a:r>
+            <a:fld id="{3D0BEC64-E679-014C-AEF6-E91C7200F0A0}" type="datetime1">
+              <a:rPr lang="de-DE" smtClean="0"/>
+              <a:t>2025-03-14</a:t>
+            </a:fld>
+            <a:endParaRPr dirty="0" lang="en-US"/>
+          </a:p>
+        </p:txBody>
+      </p:sp>
+      <p:sp>
+        <p:nvSpPr>
+          <p:cNvPr id="4" name="Foliennummernplatzhalter 3">
+            <a:extLst>
+              <a:ext uri="{FF2B5EF4-FFF2-40B4-BE49-F238E27FC236}">
+                <a16:creationId xmlns:a16="http://schemas.microsoft.com/office/drawing/2014/main" id="{BA9EE7F5-CEBD-3D43-8B32-58FEF54A7161}"/>
+              </a:ext>
+            </a:extLst>
+          </p:cNvPr>
+          <p:cNvSpPr>
+            <a:spLocks noGrp="1"/>
+          </p:cNvSpPr>
+          <p:nvPr>
+            <p:ph idx="12" sz="quarter" type="sldNum"/>
+          </p:nvPr>
+        </p:nvSpPr>
+        <p:spPr/>
+        <p:txBody>
+          <a:bodyPr/>
+          <a:lstStyle/>
+          <a:p>
+            <a:fld id="{F9EA80F1-969D-7843-BBE2-853A1F17A34A}" type="slidenum">
+              <a:rPr lang="en-GB" smtClean="0"/>
+              <a:pPr/>
+              <a:t>‹Nr.›</a:t>
+            </a:fld>
+            <a:endParaRPr dirty="0" lang="en-GB"/>
           </a:p>
         </p:txBody>
       </p:sp>
@@ -3993,35 +4038,321 @@
           <a:bodyPr/>
           <a:lstStyle/>
           <a:p>
-            <a:pPr lvl="0" marL="0" indent="0">
+            <a:pPr lvl="0" indent="0" marL="0">
               <a:buNone/>
             </a:pPr>
             <a:r>
               <a:rPr/>
-              <a:t>Two</a:t>
-            </a:r>
+              <a:t>Slide with Bullets</a:t>
+            </a:r>
+          </a:p>
+        </p:txBody>
+      </p:sp>
+      <p:sp>
+        <p:nvSpPr>
+          <p:cNvPr id="3" name="Content Placeholder 2"/>
+          <p:cNvSpPr>
+            <a:spLocks noGrp="1"/>
+          </p:cNvSpPr>
+          <p:nvPr>
+            <p:ph idx="1"/>
+          </p:nvPr>
+        </p:nvSpPr>
+        <p:spPr/>
+        <p:txBody>
+          <a:bodyPr/>
+          <a:lstStyle/>
+          <a:p>
+            <a:pPr lvl="0"/>
             <a:r>
               <a:rPr/>
-              <a:t> </a:t>
-            </a:r>
+              <a:t>Bullet 1</a:t>
+            </a:r>
+          </a:p>
+          <a:p>
+            <a:pPr lvl="0"/>
             <a:r>
               <a:rPr/>
-              <a:t>column</a:t>
-            </a:r>
+              <a:t>Bullet 2</a:t>
+            </a:r>
+          </a:p>
+          <a:p>
+            <a:pPr lvl="0"/>
             <a:r>
               <a:rPr/>
-              <a:t> </a:t>
-            </a:r>
+              <a:t>Bullet 3</a:t>
+            </a:r>
+          </a:p>
+        </p:txBody>
+      </p:sp>
+      <p:sp>
+        <p:nvSpPr>
+          <p:cNvPr id="7" name="Datumsplatzhalter 6">
+            <a:extLst>
+              <a:ext uri="{FF2B5EF4-FFF2-40B4-BE49-F238E27FC236}">
+                <a16:creationId xmlns:a16="http://schemas.microsoft.com/office/drawing/2014/main" id="{F11C80C7-74DE-4443-BAC3-F53DC65E7ED2}"/>
+              </a:ext>
+            </a:extLst>
+          </p:cNvPr>
+          <p:cNvSpPr>
+            <a:spLocks noGrp="1"/>
+          </p:cNvSpPr>
+          <p:nvPr>
+            <p:ph idx="10" sz="half" type="dt"/>
+          </p:nvPr>
+        </p:nvSpPr>
+        <p:spPr/>
+        <p:txBody>
+          <a:bodyPr/>
+          <a:lstStyle/>
+          <a:p>
+            <a:fld id="{3D0BEC64-E679-014C-AEF6-E91C7200F0A0}" type="datetime1">
+              <a:rPr lang="de-DE" smtClean="0"/>
+              <a:t>2025-03-14</a:t>
+            </a:fld>
+            <a:endParaRPr dirty="0" lang="en-US"/>
+          </a:p>
+        </p:txBody>
+      </p:sp>
+      <p:sp>
+        <p:nvSpPr>
+          <p:cNvPr id="4" name="Foliennummernplatzhalter 3">
+            <a:extLst>
+              <a:ext uri="{FF2B5EF4-FFF2-40B4-BE49-F238E27FC236}">
+                <a16:creationId xmlns:a16="http://schemas.microsoft.com/office/drawing/2014/main" id="{BA9EE7F5-CEBD-3D43-8B32-58FEF54A7161}"/>
+              </a:ext>
+            </a:extLst>
+          </p:cNvPr>
+          <p:cNvSpPr>
+            <a:spLocks noGrp="1"/>
+          </p:cNvSpPr>
+          <p:nvPr>
+            <p:ph idx="12" sz="quarter" type="sldNum"/>
+          </p:nvPr>
+        </p:nvSpPr>
+        <p:spPr/>
+        <p:txBody>
+          <a:bodyPr/>
+          <a:lstStyle/>
+          <a:p>
+            <a:fld id="{F9EA80F1-969D-7843-BBE2-853A1F17A34A}" type="slidenum">
+              <a:rPr lang="en-GB" smtClean="0"/>
+              <a:pPr/>
+              <a:t>‹Nr.›</a:t>
+            </a:fld>
+            <a:endParaRPr dirty="0" lang="en-GB"/>
+          </a:p>
+        </p:txBody>
+      </p:sp>
+    </p:spTree>
+  </p:cSld>
+</p:sld>
+</file>
+
+<file path=ppt/slides/slide4.xml><?xml version="1.0" encoding="utf-8"?>
+<p:sld xmlns:a="http://schemas.openxmlformats.org/drawingml/2006/main" xmlns:r="http://schemas.openxmlformats.org/officeDocument/2006/relationships" xmlns:p="http://schemas.openxmlformats.org/presentationml/2006/main">
+  <p:cSld>
+    <p:spTree>
+      <p:nvGrpSpPr>
+        <p:cNvPr id="1" name=""/>
+        <p:cNvGrpSpPr/>
+        <p:nvPr/>
+      </p:nvGrpSpPr>
+      <p:grpSpPr>
+        <a:xfrm>
+          <a:off x="0" y="0"/>
+          <a:ext cx="0" cy="0"/>
+          <a:chOff x="0" y="0"/>
+          <a:chExt cx="0" cy="0"/>
+        </a:xfrm>
+      </p:grpSpPr>
+      <p:sp>
+        <p:nvSpPr>
+          <p:cNvPr id="2" name="Title 1"/>
+          <p:cNvSpPr>
+            <a:spLocks noGrp="1"/>
+          </p:cNvSpPr>
+          <p:nvPr>
+            <p:ph type="title"/>
+          </p:nvPr>
+        </p:nvSpPr>
+        <p:spPr/>
+        <p:txBody>
+          <a:bodyPr/>
+          <a:lstStyle/>
+          <a:p>
+            <a:pPr lvl="0" indent="0" marL="0">
+              <a:buNone/>
+            </a:pPr>
             <a:r>
               <a:rPr/>
-              <a:t>example</a:t>
+              <a:t>Slide with R Output</a:t>
+            </a:r>
+          </a:p>
+        </p:txBody>
+      </p:sp>
+      <p:sp>
+        <p:nvSpPr>
+          <p:cNvPr id="3" name="Content Placeholder 2"/>
+          <p:cNvSpPr>
+            <a:spLocks noGrp="1"/>
+          </p:cNvSpPr>
+          <p:nvPr>
+            <p:ph idx="1"/>
+          </p:nvPr>
+        </p:nvSpPr>
+        <p:spPr/>
+        <p:txBody>
+          <a:bodyPr/>
+          <a:lstStyle/>
+          <a:p>
+            <a:pPr lvl="0" indent="0">
+              <a:buNone/>
+            </a:pPr>
+            <a:r>
+              <a:rPr>
+                <a:solidFill>
+                  <a:srgbClr val="06287E"/>
+                </a:solidFill>
+                <a:latin typeface="Courier"/>
+              </a:rPr>
+              <a:t>summary</a:t>
+            </a:r>
+            <a:r>
+              <a:rPr>
+                <a:latin typeface="Courier"/>
+              </a:rPr>
+              <a:t>(cars)</a:t>
+            </a:r>
+          </a:p>
+          <a:p>
+            <a:pPr lvl="0" indent="0">
+              <a:buNone/>
+            </a:pPr>
+            <a:r>
+              <a:rPr>
+                <a:latin typeface="Courier"/>
+              </a:rPr>
+              <a:t>##      speed           dist       
+##  Min.   : 4.0   Min.   :  2.00  
+##  1st Qu.:12.0   1st Qu.: 26.00  
+##  Median :15.0   Median : 36.00  
+##  Mean   :15.4   Mean   : 42.98  
+##  3rd Qu.:19.0   3rd Qu.: 56.00  
+##  Max.   :25.0   Max.   :120.00</a:t>
+            </a:r>
+          </a:p>
+        </p:txBody>
+      </p:sp>
+      <p:sp>
+        <p:nvSpPr>
+          <p:cNvPr id="7" name="Datumsplatzhalter 6">
+            <a:extLst>
+              <a:ext uri="{FF2B5EF4-FFF2-40B4-BE49-F238E27FC236}">
+                <a16:creationId xmlns:a16="http://schemas.microsoft.com/office/drawing/2014/main" id="{F11C80C7-74DE-4443-BAC3-F53DC65E7ED2}"/>
+              </a:ext>
+            </a:extLst>
+          </p:cNvPr>
+          <p:cNvSpPr>
+            <a:spLocks noGrp="1"/>
+          </p:cNvSpPr>
+          <p:nvPr>
+            <p:ph idx="10" sz="half" type="dt"/>
+          </p:nvPr>
+        </p:nvSpPr>
+        <p:spPr/>
+        <p:txBody>
+          <a:bodyPr/>
+          <a:lstStyle/>
+          <a:p>
+            <a:fld id="{3D0BEC64-E679-014C-AEF6-E91C7200F0A0}" type="datetime1">
+              <a:rPr lang="de-DE" smtClean="0"/>
+              <a:t>2025-03-14</a:t>
+            </a:fld>
+            <a:endParaRPr dirty="0" lang="en-US"/>
+          </a:p>
+        </p:txBody>
+      </p:sp>
+      <p:sp>
+        <p:nvSpPr>
+          <p:cNvPr id="4" name="Foliennummernplatzhalter 3">
+            <a:extLst>
+              <a:ext uri="{FF2B5EF4-FFF2-40B4-BE49-F238E27FC236}">
+                <a16:creationId xmlns:a16="http://schemas.microsoft.com/office/drawing/2014/main" id="{BA9EE7F5-CEBD-3D43-8B32-58FEF54A7161}"/>
+              </a:ext>
+            </a:extLst>
+          </p:cNvPr>
+          <p:cNvSpPr>
+            <a:spLocks noGrp="1"/>
+          </p:cNvSpPr>
+          <p:nvPr>
+            <p:ph idx="12" sz="quarter" type="sldNum"/>
+          </p:nvPr>
+        </p:nvSpPr>
+        <p:spPr/>
+        <p:txBody>
+          <a:bodyPr/>
+          <a:lstStyle/>
+          <a:p>
+            <a:fld id="{F9EA80F1-969D-7843-BBE2-853A1F17A34A}" type="slidenum">
+              <a:rPr lang="en-GB" smtClean="0"/>
+              <a:pPr/>
+              <a:t>‹Nr.›</a:t>
+            </a:fld>
+            <a:endParaRPr dirty="0" lang="en-GB"/>
+          </a:p>
+        </p:txBody>
+      </p:sp>
+    </p:spTree>
+  </p:cSld>
+</p:sld>
+</file>
+
+<file path=ppt/slides/slide5.xml><?xml version="1.0" encoding="utf-8"?>
+<p:sld xmlns:a="http://schemas.openxmlformats.org/drawingml/2006/main" xmlns:r="http://schemas.openxmlformats.org/officeDocument/2006/relationships" xmlns:p="http://schemas.openxmlformats.org/presentationml/2006/main">
+  <p:cSld>
+    <p:spTree>
+      <p:nvGrpSpPr>
+        <p:cNvPr id="1" name=""/>
+        <p:cNvGrpSpPr/>
+        <p:nvPr/>
+      </p:nvGrpSpPr>
+      <p:grpSpPr>
+        <a:xfrm>
+          <a:off x="0" y="0"/>
+          <a:ext cx="0" cy="0"/>
+          <a:chOff x="0" y="0"/>
+          <a:chExt cx="0" cy="0"/>
+        </a:xfrm>
+      </p:grpSpPr>
+      <p:sp>
+        <p:nvSpPr>
+          <p:cNvPr id="2" name="Title 1"/>
+          <p:cNvSpPr>
+            <a:spLocks noGrp="1"/>
+          </p:cNvSpPr>
+          <p:nvPr>
+            <p:ph type="title"/>
+          </p:nvPr>
+        </p:nvSpPr>
+        <p:spPr/>
+        <p:txBody>
+          <a:bodyPr/>
+          <a:lstStyle/>
+          <a:p>
+            <a:pPr lvl="0" indent="0" marL="0">
+              <a:buNone/>
+            </a:pPr>
+            <a:r>
+              <a:rPr/>
+              <a:t>Slide with Plot</a:t>
             </a:r>
           </a:p>
         </p:txBody>
       </p:sp>
       <p:pic>
         <p:nvPicPr>
-          <p:cNvPr descr="/var/folders/0n/d_dx34q96vsbrmbrkx3ld9yr0000gn/T//RtmpyjPn9o/file4e464716cd02.png" id="0" name="Picture 1"/>
+          <p:cNvPr descr="/Users/cornelius/projects/targets_template/output/presentations/presentation_files/figure-pptx/pressure-1.png" id="0" name="Picture 1"/>
           <p:cNvPicPr>
             <a:picLocks noGrp="1" noChangeAspect="1"/>
           </p:cNvPicPr>
@@ -4035,8 +4366,8 @@
         </p:blipFill>
         <p:spPr bwMode="auto">
           <a:xfrm>
-            <a:off x="203200" y="1790700"/>
-            <a:ext cx="4279900" cy="2260600"/>
+            <a:off x="1651000" y="596900"/>
+            <a:ext cx="5829300" cy="4660900"/>
           </a:xfrm>
           <a:prstGeom prst="rect">
             <a:avLst/>
@@ -4051,12 +4382,18 @@
       </p:pic>
       <p:sp>
         <p:nvSpPr>
-          <p:cNvPr id="4" name="Content Placeholder 3"/>
-          <p:cNvSpPr>
-            <a:spLocks noGrp="1"/>
-          </p:cNvSpPr>
-          <p:nvPr>
-            <p:ph sz="half" idx="2"/>
+          <p:cNvPr id="7" name="Datumsplatzhalter 6">
+            <a:extLst>
+              <a:ext uri="{FF2B5EF4-FFF2-40B4-BE49-F238E27FC236}">
+                <a16:creationId xmlns:a16="http://schemas.microsoft.com/office/drawing/2014/main" id="{F11C80C7-74DE-4443-BAC3-F53DC65E7ED2}"/>
+              </a:ext>
+            </a:extLst>
+          </p:cNvPr>
+          <p:cNvSpPr>
+            <a:spLocks noGrp="1"/>
+          </p:cNvSpPr>
+          <p:nvPr>
+            <p:ph idx="10" sz="half" type="dt"/>
           </p:nvPr>
         </p:nvSpPr>
         <p:spPr/>
@@ -4064,13 +4401,41 @@
           <a:bodyPr/>
           <a:lstStyle/>
           <a:p>
-            <a:pPr lvl="0" marL="0" indent="0">
-              <a:buNone/>
-            </a:pPr>
-            <a:r>
-              <a:rPr/>
-              <a:t>Wow, this is a nice table.</a:t>
-            </a:r>
+            <a:fld id="{3D0BEC64-E679-014C-AEF6-E91C7200F0A0}" type="datetime1">
+              <a:rPr lang="de-DE" smtClean="0"/>
+              <a:t>2025-03-14</a:t>
+            </a:fld>
+            <a:endParaRPr dirty="0" lang="en-US"/>
+          </a:p>
+        </p:txBody>
+      </p:sp>
+      <p:sp>
+        <p:nvSpPr>
+          <p:cNvPr id="4" name="Foliennummernplatzhalter 3">
+            <a:extLst>
+              <a:ext uri="{FF2B5EF4-FFF2-40B4-BE49-F238E27FC236}">
+                <a16:creationId xmlns:a16="http://schemas.microsoft.com/office/drawing/2014/main" id="{BA9EE7F5-CEBD-3D43-8B32-58FEF54A7161}"/>
+              </a:ext>
+            </a:extLst>
+          </p:cNvPr>
+          <p:cNvSpPr>
+            <a:spLocks noGrp="1"/>
+          </p:cNvSpPr>
+          <p:nvPr>
+            <p:ph idx="12" sz="quarter" type="sldNum"/>
+          </p:nvPr>
+        </p:nvSpPr>
+        <p:spPr/>
+        <p:txBody>
+          <a:bodyPr/>
+          <a:lstStyle/>
+          <a:p>
+            <a:fld id="{F9EA80F1-969D-7843-BBE2-853A1F17A34A}" type="slidenum">
+              <a:rPr lang="en-GB" smtClean="0"/>
+              <a:pPr/>
+              <a:t>‹Nr.›</a:t>
+            </a:fld>
+            <a:endParaRPr dirty="0" lang="en-GB"/>
           </a:p>
         </p:txBody>
       </p:sp>
@@ -4397,4 +4762,299 @@
   </a:objectDefaults>
   <a:extraClrSchemeLst/>
 </a:theme>
+</file>
+
+<file path=ppt/theme/theme2.xml><?xml version="1.0" encoding="utf-8"?>
+<a:theme xmlns:a="http://schemas.openxmlformats.org/drawingml/2006/main" name="Office">
+  <a:themeElements>
+    <a:clrScheme name="Office">
+      <a:dk1>
+        <a:sysClr val="windowText" lastClr="000000"/>
+      </a:dk1>
+      <a:lt1>
+        <a:sysClr val="window" lastClr="FFFFFF"/>
+      </a:lt1>
+      <a:dk2>
+        <a:srgbClr val="44546A"/>
+      </a:dk2>
+      <a:lt2>
+        <a:srgbClr val="E7E6E6"/>
+      </a:lt2>
+      <a:accent1>
+        <a:srgbClr val="4472C4"/>
+      </a:accent1>
+      <a:accent2>
+        <a:srgbClr val="ED7D31"/>
+      </a:accent2>
+      <a:accent3>
+        <a:srgbClr val="A5A5A5"/>
+      </a:accent3>
+      <a:accent4>
+        <a:srgbClr val="FFC000"/>
+      </a:accent4>
+      <a:accent5>
+        <a:srgbClr val="5B9BD5"/>
+      </a:accent5>
+      <a:accent6>
+        <a:srgbClr val="70AD47"/>
+      </a:accent6>
+      <a:hlink>
+        <a:srgbClr val="0563C1"/>
+      </a:hlink>
+      <a:folHlink>
+        <a:srgbClr val="954F72"/>
+      </a:folHlink>
+    </a:clrScheme>
+    <a:fontScheme name="Office">
+      <a:majorFont>
+        <a:latin typeface="Calibri Light" panose="020F0302020204030204"/>
+        <a:ea typeface=""/>
+        <a:cs typeface=""/>
+        <a:font script="Jpan" typeface="游ゴシック Light"/>
+        <a:font script="Hang" typeface="맑은 고딕"/>
+        <a:font script="Hans" typeface="等线 Light"/>
+        <a:font script="Hant" typeface="新細明體"/>
+        <a:font script="Arab" typeface="Times New Roman"/>
+        <a:font script="Hebr" typeface="Times New Roman"/>
+        <a:font script="Thai" typeface="Angsana New"/>
+        <a:font script="Ethi" typeface="Nyala"/>
+        <a:font script="Beng" typeface="Vrinda"/>
+        <a:font script="Gujr" typeface="Shruti"/>
+        <a:font script="Khmr" typeface="MoolBoran"/>
+        <a:font script="Knda" typeface="Tunga"/>
+        <a:font script="Guru" typeface="Raavi"/>
+        <a:font script="Cans" typeface="Euphemia"/>
+        <a:font script="Cher" typeface="Plantagenet Cherokee"/>
+        <a:font script="Yiii" typeface="Microsoft Yi Baiti"/>
+        <a:font script="Tibt" typeface="Microsoft Himalaya"/>
+        <a:font script="Thaa" typeface="MV Boli"/>
+        <a:font script="Deva" typeface="Mangal"/>
+        <a:font script="Telu" typeface="Gautami"/>
+        <a:font script="Taml" typeface="Latha"/>
+        <a:font script="Syrc" typeface="Estrangelo Edessa"/>
+        <a:font script="Orya" typeface="Kalinga"/>
+        <a:font script="Mlym" typeface="Kartika"/>
+        <a:font script="Laoo" typeface="DokChampa"/>
+        <a:font script="Sinh" typeface="Iskoola Pota"/>
+        <a:font script="Mong" typeface="Mongolian Baiti"/>
+        <a:font script="Viet" typeface="Times New Roman"/>
+        <a:font script="Uigh" typeface="Microsoft Uighur"/>
+        <a:font script="Geor" typeface="Sylfaen"/>
+        <a:font script="Armn" typeface="Arial"/>
+        <a:font script="Bugi" typeface="Leelawadee UI"/>
+        <a:font script="Bopo" typeface="Microsoft JhengHei"/>
+        <a:font script="Java" typeface="Javanese Text"/>
+        <a:font script="Lisu" typeface="Segoe UI"/>
+        <a:font script="Mymr" typeface="Myanmar Text"/>
+        <a:font script="Nkoo" typeface="Ebrima"/>
+        <a:font script="Olck" typeface="Nirmala UI"/>
+        <a:font script="Osma" typeface="Ebrima"/>
+        <a:font script="Phag" typeface="Phagspa"/>
+        <a:font script="Syrn" typeface="Estrangelo Edessa"/>
+        <a:font script="Syrj" typeface="Estrangelo Edessa"/>
+        <a:font script="Syre" typeface="Estrangelo Edessa"/>
+        <a:font script="Sora" typeface="Nirmala UI"/>
+        <a:font script="Tale" typeface="Microsoft Tai Le"/>
+        <a:font script="Talu" typeface="Microsoft New Tai Lue"/>
+        <a:font script="Tfng" typeface="Ebrima"/>
+      </a:majorFont>
+      <a:minorFont>
+        <a:latin typeface="Calibri" panose="020F0502020204030204"/>
+        <a:ea typeface=""/>
+        <a:cs typeface=""/>
+        <a:font script="Jpan" typeface="游ゴシック"/>
+        <a:font script="Hang" typeface="맑은 고딕"/>
+        <a:font script="Hans" typeface="等线"/>
+        <a:font script="Hant" typeface="新細明體"/>
+        <a:font script="Arab" typeface="Arial"/>
+        <a:font script="Hebr" typeface="Arial"/>
+        <a:font script="Thai" typeface="Cordia New"/>
+        <a:font script="Ethi" typeface="Nyala"/>
+        <a:font script="Beng" typeface="Vrinda"/>
+        <a:font script="Gujr" typeface="Shruti"/>
+        <a:font script="Khmr" typeface="DaunPenh"/>
+        <a:font script="Knda" typeface="Tunga"/>
+        <a:font script="Guru" typeface="Raavi"/>
+        <a:font script="Cans" typeface="Euphemia"/>
+        <a:font script="Cher" typeface="Plantagenet Cherokee"/>
+        <a:font script="Yiii" typeface="Microsoft Yi Baiti"/>
+        <a:font script="Tibt" typeface="Microsoft Himalaya"/>
+        <a:font script="Thaa" typeface="MV Boli"/>
+        <a:font script="Deva" typeface="Mangal"/>
+        <a:font script="Telu" typeface="Gautami"/>
+        <a:font script="Taml" typeface="Latha"/>
+        <a:font script="Syrc" typeface="Estrangelo Edessa"/>
+        <a:font script="Orya" typeface="Kalinga"/>
+        <a:font script="Mlym" typeface="Kartika"/>
+        <a:font script="Laoo" typeface="DokChampa"/>
+        <a:font script="Sinh" typeface="Iskoola Pota"/>
+        <a:font script="Mong" typeface="Mongolian Baiti"/>
+        <a:font script="Viet" typeface="Arial"/>
+        <a:font script="Uigh" typeface="Microsoft Uighur"/>
+        <a:font script="Geor" typeface="Sylfaen"/>
+        <a:font script="Armn" typeface="Arial"/>
+        <a:font script="Bugi" typeface="Leelawadee UI"/>
+        <a:font script="Bopo" typeface="Microsoft JhengHei"/>
+        <a:font script="Java" typeface="Javanese Text"/>
+        <a:font script="Lisu" typeface="Segoe UI"/>
+        <a:font script="Mymr" typeface="Myanmar Text"/>
+        <a:font script="Nkoo" typeface="Ebrima"/>
+        <a:font script="Olck" typeface="Nirmala UI"/>
+        <a:font script="Osma" typeface="Ebrima"/>
+        <a:font script="Phag" typeface="Phagspa"/>
+        <a:font script="Syrn" typeface="Estrangelo Edessa"/>
+        <a:font script="Syrj" typeface="Estrangelo Edessa"/>
+        <a:font script="Syre" typeface="Estrangelo Edessa"/>
+        <a:font script="Sora" typeface="Nirmala UI"/>
+        <a:font script="Tale" typeface="Microsoft Tai Le"/>
+        <a:font script="Talu" typeface="Microsoft New Tai Lue"/>
+        <a:font script="Tfng" typeface="Ebrima"/>
+      </a:minorFont>
+    </a:fontScheme>
+    <a:fmtScheme name="Office">
+      <a:fillStyleLst>
+        <a:solidFill>
+          <a:schemeClr val="phClr"/>
+        </a:solidFill>
+        <a:gradFill rotWithShape="1">
+          <a:gsLst>
+            <a:gs pos="0">
+              <a:schemeClr val="phClr">
+                <a:lumMod val="110000"/>
+                <a:satMod val="105000"/>
+                <a:tint val="67000"/>
+              </a:schemeClr>
+            </a:gs>
+            <a:gs pos="50000">
+              <a:schemeClr val="phClr">
+                <a:lumMod val="105000"/>
+                <a:satMod val="103000"/>
+                <a:tint val="73000"/>
+              </a:schemeClr>
+            </a:gs>
+            <a:gs pos="100000">
+              <a:schemeClr val="phClr">
+                <a:lumMod val="105000"/>
+                <a:satMod val="109000"/>
+                <a:tint val="81000"/>
+              </a:schemeClr>
+            </a:gs>
+          </a:gsLst>
+          <a:lin ang="5400000" scaled="0"/>
+        </a:gradFill>
+        <a:gradFill rotWithShape="1">
+          <a:gsLst>
+            <a:gs pos="0">
+              <a:schemeClr val="phClr">
+                <a:satMod val="103000"/>
+                <a:lumMod val="102000"/>
+                <a:tint val="94000"/>
+              </a:schemeClr>
+            </a:gs>
+            <a:gs pos="50000">
+              <a:schemeClr val="phClr">
+                <a:satMod val="110000"/>
+                <a:lumMod val="100000"/>
+                <a:shade val="100000"/>
+              </a:schemeClr>
+            </a:gs>
+            <a:gs pos="100000">
+              <a:schemeClr val="phClr">
+                <a:lumMod val="99000"/>
+                <a:satMod val="120000"/>
+                <a:shade val="78000"/>
+              </a:schemeClr>
+            </a:gs>
+          </a:gsLst>
+          <a:lin ang="5400000" scaled="0"/>
+        </a:gradFill>
+      </a:fillStyleLst>
+      <a:lnStyleLst>
+        <a:ln w="6350" cap="flat" cmpd="sng" algn="ctr">
+          <a:solidFill>
+            <a:schemeClr val="phClr"/>
+          </a:solidFill>
+          <a:prstDash val="solid"/>
+          <a:miter lim="800000"/>
+        </a:ln>
+        <a:ln w="12700" cap="flat" cmpd="sng" algn="ctr">
+          <a:solidFill>
+            <a:schemeClr val="phClr"/>
+          </a:solidFill>
+          <a:prstDash val="solid"/>
+          <a:miter lim="800000"/>
+        </a:ln>
+        <a:ln w="19050" cap="flat" cmpd="sng" algn="ctr">
+          <a:solidFill>
+            <a:schemeClr val="phClr"/>
+          </a:solidFill>
+          <a:prstDash val="solid"/>
+          <a:miter lim="800000"/>
+        </a:ln>
+      </a:lnStyleLst>
+      <a:effectStyleLst>
+        <a:effectStyle>
+          <a:effectLst/>
+        </a:effectStyle>
+        <a:effectStyle>
+          <a:effectLst/>
+        </a:effectStyle>
+        <a:effectStyle>
+          <a:effectLst>
+            <a:outerShdw blurRad="57150" dist="19050" dir="5400000" algn="ctr" rotWithShape="0">
+              <a:srgbClr val="000000">
+                <a:alpha val="63000"/>
+              </a:srgbClr>
+            </a:outerShdw>
+          </a:effectLst>
+        </a:effectStyle>
+      </a:effectStyleLst>
+      <a:bgFillStyleLst>
+        <a:solidFill>
+          <a:schemeClr val="phClr"/>
+        </a:solidFill>
+        <a:solidFill>
+          <a:schemeClr val="phClr">
+            <a:tint val="95000"/>
+            <a:satMod val="170000"/>
+          </a:schemeClr>
+        </a:solidFill>
+        <a:gradFill rotWithShape="1">
+          <a:gsLst>
+            <a:gs pos="0">
+              <a:schemeClr val="phClr">
+                <a:tint val="93000"/>
+                <a:satMod val="150000"/>
+                <a:shade val="98000"/>
+                <a:lumMod val="102000"/>
+              </a:schemeClr>
+            </a:gs>
+            <a:gs pos="50000">
+              <a:schemeClr val="phClr">
+                <a:tint val="98000"/>
+                <a:satMod val="130000"/>
+                <a:shade val="90000"/>
+                <a:lumMod val="103000"/>
+              </a:schemeClr>
+            </a:gs>
+            <a:gs pos="100000">
+              <a:schemeClr val="phClr">
+                <a:shade val="63000"/>
+                <a:satMod val="120000"/>
+              </a:schemeClr>
+            </a:gs>
+          </a:gsLst>
+          <a:lin ang="5400000" scaled="0"/>
+        </a:gradFill>
+      </a:bgFillStyleLst>
+    </a:fmtScheme>
+  </a:themeElements>
+  <a:objectDefaults/>
+  <a:extraClrSchemeLst/>
+  <a:extLst>
+    <a:ext uri="{05A4C25C-085E-4340-85A3-A5531E510DB2}">
+      <thm15:themeFamily xmlns:thm15="http://schemas.microsoft.com/office/thememl/2012/main" name="Office Theme" id="{62F939B6-93AF-4DB8-9C6B-D6C7DFDC589F}" vid="{4A3C46E8-61CC-4603-A589-7422A47A8E4A}"/>
+    </a:ext>
+  </a:extLst>
+</a:theme>
 </file>
</xml_diff>